<commit_message>
small fixes in slides
</commit_message>
<xml_diff>
--- a/solid-and-fp.pptx
+++ b/solid-and-fp.pptx
@@ -42,19 +42,19 @@
     <p:sldId id="328" r:id="rId33"/>
     <p:sldId id="326" r:id="rId34"/>
     <p:sldId id="331" r:id="rId35"/>
-    <p:sldId id="332" r:id="rId36"/>
-    <p:sldId id="325" r:id="rId37"/>
-    <p:sldId id="320" r:id="rId38"/>
-    <p:sldId id="321" r:id="rId39"/>
-    <p:sldId id="322" r:id="rId40"/>
-    <p:sldId id="323" r:id="rId41"/>
-    <p:sldId id="324" r:id="rId42"/>
-    <p:sldId id="333" r:id="rId43"/>
-    <p:sldId id="334" r:id="rId44"/>
-    <p:sldId id="329" r:id="rId45"/>
-    <p:sldId id="336" r:id="rId46"/>
-    <p:sldId id="337" r:id="rId47"/>
-    <p:sldId id="335" r:id="rId48"/>
+    <p:sldId id="325" r:id="rId36"/>
+    <p:sldId id="320" r:id="rId37"/>
+    <p:sldId id="321" r:id="rId38"/>
+    <p:sldId id="322" r:id="rId39"/>
+    <p:sldId id="323" r:id="rId40"/>
+    <p:sldId id="324" r:id="rId41"/>
+    <p:sldId id="333" r:id="rId42"/>
+    <p:sldId id="334" r:id="rId43"/>
+    <p:sldId id="329" r:id="rId44"/>
+    <p:sldId id="336" r:id="rId45"/>
+    <p:sldId id="337" r:id="rId46"/>
+    <p:sldId id="335" r:id="rId47"/>
+    <p:sldId id="332" r:id="rId48"/>
   </p:sldIdLst>
   <p:sldSz cx="9144000" cy="6858000" type="screen4x3"/>
   <p:notesSz cx="6858000" cy="9144000"/>
@@ -584,7 +584,7 @@
           <a:p>
             <a:fld id="{58F3E9B2-3B29-419F-922F-EEC9D43D4BE2}" type="slidenum">
               <a:rPr lang="ru-RU" smtClean="0"/>
-              <a:t>45</a:t>
+              <a:t>44</a:t>
             </a:fld>
             <a:endParaRPr lang="ru-RU"/>
           </a:p>
@@ -742,7 +742,7 @@
           <a:p>
             <a:fld id="{DCDCBEE7-9590-4FF6-ADDF-3D4B876C8442}" type="datetimeFigureOut">
               <a:rPr lang="ru-RU" smtClean="0"/>
-              <a:t>04.12.2015</a:t>
+              <a:t>05.12.2015</a:t>
             </a:fld>
             <a:endParaRPr lang="ru-RU"/>
           </a:p>
@@ -943,7 +943,7 @@
           <a:p>
             <a:fld id="{DCDCBEE7-9590-4FF6-ADDF-3D4B876C8442}" type="datetimeFigureOut">
               <a:rPr lang="ru-RU" smtClean="0"/>
-              <a:t>04.12.2015</a:t>
+              <a:t>05.12.2015</a:t>
             </a:fld>
             <a:endParaRPr lang="ru-RU"/>
           </a:p>
@@ -1147,7 +1147,7 @@
           <a:p>
             <a:fld id="{DCDCBEE7-9590-4FF6-ADDF-3D4B876C8442}" type="datetimeFigureOut">
               <a:rPr lang="ru-RU" smtClean="0"/>
-              <a:t>04.12.2015</a:t>
+              <a:t>05.12.2015</a:t>
             </a:fld>
             <a:endParaRPr lang="ru-RU"/>
           </a:p>
@@ -1341,7 +1341,7 @@
           <a:p>
             <a:fld id="{DCDCBEE7-9590-4FF6-ADDF-3D4B876C8442}" type="datetimeFigureOut">
               <a:rPr lang="ru-RU" smtClean="0"/>
-              <a:t>04.12.2015</a:t>
+              <a:t>05.12.2015</a:t>
             </a:fld>
             <a:endParaRPr lang="ru-RU"/>
           </a:p>
@@ -1616,7 +1616,7 @@
           <a:p>
             <a:fld id="{DCDCBEE7-9590-4FF6-ADDF-3D4B876C8442}" type="datetimeFigureOut">
               <a:rPr lang="ru-RU" smtClean="0"/>
-              <a:t>04.12.2015</a:t>
+              <a:t>05.12.2015</a:t>
             </a:fld>
             <a:endParaRPr lang="ru-RU"/>
           </a:p>
@@ -1872,7 +1872,7 @@
           <a:p>
             <a:fld id="{DCDCBEE7-9590-4FF6-ADDF-3D4B876C8442}" type="datetimeFigureOut">
               <a:rPr lang="ru-RU" smtClean="0"/>
-              <a:t>04.12.2015</a:t>
+              <a:t>05.12.2015</a:t>
             </a:fld>
             <a:endParaRPr lang="ru-RU"/>
           </a:p>
@@ -2263,7 +2263,7 @@
           <a:p>
             <a:fld id="{DCDCBEE7-9590-4FF6-ADDF-3D4B876C8442}" type="datetimeFigureOut">
               <a:rPr lang="ru-RU" smtClean="0"/>
-              <a:t>04.12.2015</a:t>
+              <a:t>05.12.2015</a:t>
             </a:fld>
             <a:endParaRPr lang="ru-RU"/>
           </a:p>
@@ -2405,7 +2405,7 @@
           <a:p>
             <a:fld id="{DCDCBEE7-9590-4FF6-ADDF-3D4B876C8442}" type="datetimeFigureOut">
               <a:rPr lang="ru-RU" smtClean="0"/>
-              <a:t>04.12.2015</a:t>
+              <a:t>05.12.2015</a:t>
             </a:fld>
             <a:endParaRPr lang="ru-RU"/>
           </a:p>
@@ -2524,7 +2524,7 @@
           <a:p>
             <a:fld id="{DCDCBEE7-9590-4FF6-ADDF-3D4B876C8442}" type="datetimeFigureOut">
               <a:rPr lang="ru-RU" smtClean="0"/>
-              <a:t>04.12.2015</a:t>
+              <a:t>05.12.2015</a:t>
             </a:fld>
             <a:endParaRPr lang="ru-RU"/>
           </a:p>
@@ -2825,7 +2825,7 @@
           <a:p>
             <a:fld id="{DCDCBEE7-9590-4FF6-ADDF-3D4B876C8442}" type="datetimeFigureOut">
               <a:rPr lang="ru-RU" smtClean="0"/>
-              <a:t>04.12.2015</a:t>
+              <a:t>05.12.2015</a:t>
             </a:fld>
             <a:endParaRPr lang="ru-RU"/>
           </a:p>
@@ -3106,7 +3106,7 @@
           <a:p>
             <a:fld id="{DCDCBEE7-9590-4FF6-ADDF-3D4B876C8442}" type="datetimeFigureOut">
               <a:rPr lang="ru-RU" smtClean="0"/>
-              <a:t>04.12.2015</a:t>
+              <a:t>05.12.2015</a:t>
             </a:fld>
             <a:endParaRPr lang="ru-RU"/>
           </a:p>
@@ -14692,6 +14692,29 @@
               </a:rPr>
               <a:t>    </a:t>
             </a:r>
+            <a:endParaRPr lang="ru-RU" sz="2000" dirty="0" smtClean="0">
+              <a:solidFill>
+                <a:srgbClr val="000000"/>
+              </a:solidFill>
+              <a:highlight>
+                <a:srgbClr val="FFFFFF"/>
+              </a:highlight>
+              <a:latin typeface="Consolas" panose="020B0609020204030204" pitchFamily="49" charset="0"/>
+            </a:endParaRPr>
+          </a:p>
+          <a:p>
+            <a:pPr marL="0" indent="0">
+              <a:buNone/>
+            </a:pPr>
+            <a:endParaRPr lang="en-US" sz="2000" dirty="0" smtClean="0">
+              <a:solidFill>
+                <a:srgbClr val="000000"/>
+              </a:solidFill>
+              <a:highlight>
+                <a:srgbClr val="FFFFFF"/>
+              </a:highlight>
+              <a:latin typeface="Consolas" panose="020B0609020204030204" pitchFamily="49" charset="0"/>
+            </a:endParaRPr>
           </a:p>
           <a:p>
             <a:pPr marL="0" indent="0">
@@ -18194,7 +18217,11 @@
             </a:r>
             <a:r>
               <a:rPr lang="en-US" dirty="0" smtClean="0"/>
-              <a:t>immutable</a:t>
+              <a:t>immutable. </a:t>
+            </a:r>
+            <a:r>
+              <a:rPr lang="ru-RU" dirty="0" smtClean="0"/>
+              <a:t>Отражающие предметную область.</a:t>
             </a:r>
             <a:endParaRPr lang="ru-RU" dirty="0" smtClean="0"/>
           </a:p>
@@ -18222,7 +18249,14 @@
             </a:r>
             <a:r>
               <a:rPr lang="ru-RU" dirty="0" smtClean="0"/>
-              <a:t>объекты</a:t>
+              <a:t>объекты. </a:t>
+            </a:r>
+            <a:br>
+              <a:rPr lang="ru-RU" dirty="0" smtClean="0"/>
+            </a:br>
+            <a:r>
+              <a:rPr lang="ru-RU" dirty="0" smtClean="0"/>
+              <a:t>Отражающие предметную область.</a:t>
             </a:r>
             <a:endParaRPr lang="en-US" dirty="0" smtClean="0"/>
           </a:p>
@@ -18296,7 +18330,141 @@
   <p:timing>
     <p:tnLst>
       <p:par>
-        <p:cTn id="1" dur="indefinite" restart="never" nodeType="tmRoot"/>
+        <p:cTn id="1" dur="indefinite" restart="never" nodeType="tmRoot">
+          <p:childTnLst>
+            <p:seq concurrent="1" nextAc="seek">
+              <p:cTn id="2" dur="indefinite" nodeType="mainSeq">
+                <p:childTnLst>
+                  <p:par>
+                    <p:cTn id="3" fill="hold">
+                      <p:stCondLst>
+                        <p:cond delay="indefinite"/>
+                      </p:stCondLst>
+                      <p:childTnLst>
+                        <p:par>
+                          <p:cTn id="4" fill="hold">
+                            <p:stCondLst>
+                              <p:cond delay="0"/>
+                            </p:stCondLst>
+                            <p:childTnLst>
+                              <p:par>
+                                <p:cTn id="5" presetID="1" presetClass="entr" presetSubtype="0" fill="hold" nodeType="clickEffect">
+                                  <p:stCondLst>
+                                    <p:cond delay="0"/>
+                                  </p:stCondLst>
+                                  <p:childTnLst>
+                                    <p:set>
+                                      <p:cBhvr>
+                                        <p:cTn id="6" dur="1" fill="hold">
+                                          <p:stCondLst>
+                                            <p:cond delay="0"/>
+                                          </p:stCondLst>
+                                        </p:cTn>
+                                        <p:tgtEl>
+                                          <p:spTgt spid="3">
+                                            <p:txEl>
+                                              <p:pRg st="2" end="2"/>
+                                            </p:txEl>
+                                          </p:spTgt>
+                                        </p:tgtEl>
+                                        <p:attrNameLst>
+                                          <p:attrName>style.visibility</p:attrName>
+                                        </p:attrNameLst>
+                                      </p:cBhvr>
+                                      <p:to>
+                                        <p:strVal val="visible"/>
+                                      </p:to>
+                                    </p:set>
+                                  </p:childTnLst>
+                                </p:cTn>
+                              </p:par>
+                              <p:par>
+                                <p:cTn id="7" presetID="1" presetClass="entr" presetSubtype="0" fill="hold" nodeType="withEffect">
+                                  <p:stCondLst>
+                                    <p:cond delay="0"/>
+                                  </p:stCondLst>
+                                  <p:childTnLst>
+                                    <p:set>
+                                      <p:cBhvr>
+                                        <p:cTn id="8" dur="1" fill="hold">
+                                          <p:stCondLst>
+                                            <p:cond delay="0"/>
+                                          </p:stCondLst>
+                                        </p:cTn>
+                                        <p:tgtEl>
+                                          <p:spTgt spid="3">
+                                            <p:txEl>
+                                              <p:pRg st="3" end="3"/>
+                                            </p:txEl>
+                                          </p:spTgt>
+                                        </p:tgtEl>
+                                        <p:attrNameLst>
+                                          <p:attrName>style.visibility</p:attrName>
+                                        </p:attrNameLst>
+                                      </p:cBhvr>
+                                      <p:to>
+                                        <p:strVal val="visible"/>
+                                      </p:to>
+                                    </p:set>
+                                  </p:childTnLst>
+                                </p:cTn>
+                              </p:par>
+                              <p:par>
+                                <p:cTn id="9" presetID="1" presetClass="entr" presetSubtype="0" fill="hold" nodeType="withEffect">
+                                  <p:stCondLst>
+                                    <p:cond delay="0"/>
+                                  </p:stCondLst>
+                                  <p:childTnLst>
+                                    <p:set>
+                                      <p:cBhvr>
+                                        <p:cTn id="10" dur="1" fill="hold">
+                                          <p:stCondLst>
+                                            <p:cond delay="0"/>
+                                          </p:stCondLst>
+                                        </p:cTn>
+                                        <p:tgtEl>
+                                          <p:spTgt spid="3">
+                                            <p:txEl>
+                                              <p:pRg st="4" end="4"/>
+                                            </p:txEl>
+                                          </p:spTgt>
+                                        </p:tgtEl>
+                                        <p:attrNameLst>
+                                          <p:attrName>style.visibility</p:attrName>
+                                        </p:attrNameLst>
+                                      </p:cBhvr>
+                                      <p:to>
+                                        <p:strVal val="visible"/>
+                                      </p:to>
+                                    </p:set>
+                                  </p:childTnLst>
+                                </p:cTn>
+                              </p:par>
+                            </p:childTnLst>
+                          </p:cTn>
+                        </p:par>
+                      </p:childTnLst>
+                    </p:cTn>
+                  </p:par>
+                </p:childTnLst>
+              </p:cTn>
+              <p:prevCondLst>
+                <p:cond evt="onPrev" delay="0">
+                  <p:tgtEl>
+                    <p:sldTgt/>
+                  </p:tgtEl>
+                </p:cond>
+              </p:prevCondLst>
+              <p:nextCondLst>
+                <p:cond evt="onNext" delay="0">
+                  <p:tgtEl>
+                    <p:sldTgt/>
+                  </p:tgtEl>
+                </p:cond>
+              </p:nextCondLst>
+            </p:seq>
+          </p:childTnLst>
+        </p:cTn>
       </p:par>
     </p:tnLst>
   </p:timing>
@@ -18355,7 +18523,7 @@
         </p:nvSpPr>
         <p:spPr>
           <a:xfrm>
-            <a:off x="347330" y="1136136"/>
+            <a:off x="338704" y="1136136"/>
             <a:ext cx="8796670" cy="5428568"/>
           </a:xfrm>
         </p:spPr>
@@ -18821,6 +18989,55 @@
                       </p:childTnLst>
                     </p:cTn>
                   </p:par>
+                  <p:par>
+                    <p:cTn id="11" fill="hold">
+                      <p:stCondLst>
+                        <p:cond delay="indefinite"/>
+                      </p:stCondLst>
+                      <p:childTnLst>
+                        <p:par>
+                          <p:cTn id="12" fill="hold">
+                            <p:stCondLst>
+                              <p:cond delay="0"/>
+                            </p:stCondLst>
+                            <p:childTnLst>
+                              <p:par>
+                                <p:cTn id="13" presetID="1" presetClass="entr" presetSubtype="0" fill="hold" nodeType="clickEffect">
+                                  <p:stCondLst>
+                                    <p:cond delay="0"/>
+                                  </p:stCondLst>
+                                  <p:childTnLst>
+                                    <p:set>
+                                      <p:cBhvr>
+                                        <p:cTn id="14" dur="1" fill="hold">
+                                          <p:stCondLst>
+                                            <p:cond delay="0"/>
+                                          </p:stCondLst>
+                                        </p:cTn>
+                                        <p:tgtEl>
+                                          <p:spTgt spid="3">
+                                            <p:txEl>
+                                              <p:pRg st="5" end="5"/>
+                                            </p:txEl>
+                                          </p:spTgt>
+                                        </p:tgtEl>
+                                        <p:attrNameLst>
+                                          <p:attrName>style.visibility</p:attrName>
+                                        </p:attrNameLst>
+                                      </p:cBhvr>
+                                      <p:to>
+                                        <p:strVal val="visible"/>
+                                      </p:to>
+                                    </p:set>
+                                  </p:childTnLst>
+                                </p:cTn>
+                              </p:par>
+                            </p:childTnLst>
+                          </p:cTn>
+                        </p:par>
+                      </p:childTnLst>
+                    </p:cTn>
+                  </p:par>
                 </p:childTnLst>
               </p:cTn>
               <p:prevCondLst>
@@ -19354,6 +19571,55 @@
                                     <p:set>
                                       <p:cBhvr>
                                         <p:cTn id="6" dur="1" fill="hold">
+                                          <p:stCondLst>
+                                            <p:cond delay="0"/>
+                                          </p:stCondLst>
+                                        </p:cTn>
+                                        <p:tgtEl>
+                                          <p:spTgt spid="3">
+                                            <p:txEl>
+                                              <p:pRg st="2" end="2"/>
+                                            </p:txEl>
+                                          </p:spTgt>
+                                        </p:tgtEl>
+                                        <p:attrNameLst>
+                                          <p:attrName>style.visibility</p:attrName>
+                                        </p:attrNameLst>
+                                      </p:cBhvr>
+                                      <p:to>
+                                        <p:strVal val="visible"/>
+                                      </p:to>
+                                    </p:set>
+                                  </p:childTnLst>
+                                </p:cTn>
+                              </p:par>
+                            </p:childTnLst>
+                          </p:cTn>
+                        </p:par>
+                      </p:childTnLst>
+                    </p:cTn>
+                  </p:par>
+                  <p:par>
+                    <p:cTn id="7" fill="hold">
+                      <p:stCondLst>
+                        <p:cond delay="indefinite"/>
+                      </p:stCondLst>
+                      <p:childTnLst>
+                        <p:par>
+                          <p:cTn id="8" fill="hold">
+                            <p:stCondLst>
+                              <p:cond delay="0"/>
+                            </p:stCondLst>
+                            <p:childTnLst>
+                              <p:par>
+                                <p:cTn id="9" presetID="1" presetClass="entr" presetSubtype="0" fill="hold" nodeType="clickEffect">
+                                  <p:stCondLst>
+                                    <p:cond delay="0"/>
+                                  </p:stCondLst>
+                                  <p:childTnLst>
+                                    <p:set>
+                                      <p:cBhvr>
+                                        <p:cTn id="10" dur="1" fill="hold">
                                           <p:stCondLst>
                                             <p:cond delay="0"/>
                                           </p:stCondLst>
@@ -20690,351 +20956,9 @@
   <p:timing>
     <p:tnLst>
       <p:par>
-        <p:cTn id="1" dur="indefinite" restart="never" nodeType="tmRoot">
-          <p:childTnLst>
-            <p:seq concurrent="1" nextAc="seek">
-              <p:cTn id="2" dur="indefinite" nodeType="mainSeq">
-                <p:childTnLst>
-                  <p:par>
-                    <p:cTn id="3" fill="hold">
-                      <p:stCondLst>
-                        <p:cond delay="indefinite"/>
-                      </p:stCondLst>
-                      <p:childTnLst>
-                        <p:par>
-                          <p:cTn id="4" fill="hold">
-                            <p:stCondLst>
-                              <p:cond delay="0"/>
-                            </p:stCondLst>
-                            <p:childTnLst>
-                              <p:par>
-                                <p:cTn id="5" presetID="1" presetClass="entr" presetSubtype="0" fill="hold" grpId="0" nodeType="clickEffect">
-                                  <p:stCondLst>
-                                    <p:cond delay="0"/>
-                                  </p:stCondLst>
-                                  <p:childTnLst>
-                                    <p:set>
-                                      <p:cBhvr>
-                                        <p:cTn id="6" dur="1" fill="hold">
-                                          <p:stCondLst>
-                                            <p:cond delay="0"/>
-                                          </p:stCondLst>
-                                        </p:cTn>
-                                        <p:tgtEl>
-                                          <p:spTgt spid="4">
-                                            <p:txEl>
-                                              <p:pRg st="0" end="0"/>
-                                            </p:txEl>
-                                          </p:spTgt>
-                                        </p:tgtEl>
-                                        <p:attrNameLst>
-                                          <p:attrName>style.visibility</p:attrName>
-                                        </p:attrNameLst>
-                                      </p:cBhvr>
-                                      <p:to>
-                                        <p:strVal val="visible"/>
-                                      </p:to>
-                                    </p:set>
-                                  </p:childTnLst>
-                                </p:cTn>
-                              </p:par>
-                            </p:childTnLst>
-                          </p:cTn>
-                        </p:par>
-                      </p:childTnLst>
-                    </p:cTn>
-                  </p:par>
-                  <p:par>
-                    <p:cTn id="7" fill="hold">
-                      <p:stCondLst>
-                        <p:cond delay="indefinite"/>
-                      </p:stCondLst>
-                      <p:childTnLst>
-                        <p:par>
-                          <p:cTn id="8" fill="hold">
-                            <p:stCondLst>
-                              <p:cond delay="0"/>
-                            </p:stCondLst>
-                            <p:childTnLst>
-                              <p:par>
-                                <p:cTn id="9" presetID="1" presetClass="entr" presetSubtype="0" fill="hold" grpId="0" nodeType="clickEffect">
-                                  <p:stCondLst>
-                                    <p:cond delay="0"/>
-                                  </p:stCondLst>
-                                  <p:childTnLst>
-                                    <p:set>
-                                      <p:cBhvr>
-                                        <p:cTn id="10" dur="1" fill="hold">
-                                          <p:stCondLst>
-                                            <p:cond delay="0"/>
-                                          </p:stCondLst>
-                                        </p:cTn>
-                                        <p:tgtEl>
-                                          <p:spTgt spid="4">
-                                            <p:txEl>
-                                              <p:pRg st="1" end="1"/>
-                                            </p:txEl>
-                                          </p:spTgt>
-                                        </p:tgtEl>
-                                        <p:attrNameLst>
-                                          <p:attrName>style.visibility</p:attrName>
-                                        </p:attrNameLst>
-                                      </p:cBhvr>
-                                      <p:to>
-                                        <p:strVal val="visible"/>
-                                      </p:to>
-                                    </p:set>
-                                  </p:childTnLst>
-                                </p:cTn>
-                              </p:par>
-                            </p:childTnLst>
-                          </p:cTn>
-                        </p:par>
-                      </p:childTnLst>
-                    </p:cTn>
-                  </p:par>
-                  <p:par>
-                    <p:cTn id="11" fill="hold">
-                      <p:stCondLst>
-                        <p:cond delay="indefinite"/>
-                      </p:stCondLst>
-                      <p:childTnLst>
-                        <p:par>
-                          <p:cTn id="12" fill="hold">
-                            <p:stCondLst>
-                              <p:cond delay="0"/>
-                            </p:stCondLst>
-                            <p:childTnLst>
-                              <p:par>
-                                <p:cTn id="13" presetID="1" presetClass="entr" presetSubtype="0" fill="hold" grpId="0" nodeType="clickEffect">
-                                  <p:stCondLst>
-                                    <p:cond delay="0"/>
-                                  </p:stCondLst>
-                                  <p:childTnLst>
-                                    <p:set>
-                                      <p:cBhvr>
-                                        <p:cTn id="14" dur="1" fill="hold">
-                                          <p:stCondLst>
-                                            <p:cond delay="0"/>
-                                          </p:stCondLst>
-                                        </p:cTn>
-                                        <p:tgtEl>
-                                          <p:spTgt spid="4">
-                                            <p:txEl>
-                                              <p:pRg st="2" end="2"/>
-                                            </p:txEl>
-                                          </p:spTgt>
-                                        </p:tgtEl>
-                                        <p:attrNameLst>
-                                          <p:attrName>style.visibility</p:attrName>
-                                        </p:attrNameLst>
-                                      </p:cBhvr>
-                                      <p:to>
-                                        <p:strVal val="visible"/>
-                                      </p:to>
-                                    </p:set>
-                                  </p:childTnLst>
-                                </p:cTn>
-                              </p:par>
-                              <p:par>
-                                <p:cTn id="15" presetID="1" presetClass="entr" presetSubtype="0" fill="hold" grpId="0" nodeType="withEffect">
-                                  <p:stCondLst>
-                                    <p:cond delay="0"/>
-                                  </p:stCondLst>
-                                  <p:childTnLst>
-                                    <p:set>
-                                      <p:cBhvr>
-                                        <p:cTn id="16" dur="1" fill="hold">
-                                          <p:stCondLst>
-                                            <p:cond delay="0"/>
-                                          </p:stCondLst>
-                                        </p:cTn>
-                                        <p:tgtEl>
-                                          <p:spTgt spid="4">
-                                            <p:txEl>
-                                              <p:pRg st="3" end="3"/>
-                                            </p:txEl>
-                                          </p:spTgt>
-                                        </p:tgtEl>
-                                        <p:attrNameLst>
-                                          <p:attrName>style.visibility</p:attrName>
-                                        </p:attrNameLst>
-                                      </p:cBhvr>
-                                      <p:to>
-                                        <p:strVal val="visible"/>
-                                      </p:to>
-                                    </p:set>
-                                  </p:childTnLst>
-                                </p:cTn>
-                              </p:par>
-                              <p:par>
-                                <p:cTn id="17" presetID="1" presetClass="entr" presetSubtype="0" fill="hold" grpId="0" nodeType="withEffect">
-                                  <p:stCondLst>
-                                    <p:cond delay="0"/>
-                                  </p:stCondLst>
-                                  <p:childTnLst>
-                                    <p:set>
-                                      <p:cBhvr>
-                                        <p:cTn id="18" dur="1" fill="hold">
-                                          <p:stCondLst>
-                                            <p:cond delay="0"/>
-                                          </p:stCondLst>
-                                        </p:cTn>
-                                        <p:tgtEl>
-                                          <p:spTgt spid="4">
-                                            <p:txEl>
-                                              <p:pRg st="4" end="4"/>
-                                            </p:txEl>
-                                          </p:spTgt>
-                                        </p:tgtEl>
-                                        <p:attrNameLst>
-                                          <p:attrName>style.visibility</p:attrName>
-                                        </p:attrNameLst>
-                                      </p:cBhvr>
-                                      <p:to>
-                                        <p:strVal val="visible"/>
-                                      </p:to>
-                                    </p:set>
-                                  </p:childTnLst>
-                                </p:cTn>
-                              </p:par>
-                              <p:par>
-                                <p:cTn id="19" presetID="1" presetClass="entr" presetSubtype="0" fill="hold" grpId="0" nodeType="withEffect">
-                                  <p:stCondLst>
-                                    <p:cond delay="0"/>
-                                  </p:stCondLst>
-                                  <p:childTnLst>
-                                    <p:set>
-                                      <p:cBhvr>
-                                        <p:cTn id="20" dur="1" fill="hold">
-                                          <p:stCondLst>
-                                            <p:cond delay="0"/>
-                                          </p:stCondLst>
-                                        </p:cTn>
-                                        <p:tgtEl>
-                                          <p:spTgt spid="4">
-                                            <p:txEl>
-                                              <p:pRg st="5" end="5"/>
-                                            </p:txEl>
-                                          </p:spTgt>
-                                        </p:tgtEl>
-                                        <p:attrNameLst>
-                                          <p:attrName>style.visibility</p:attrName>
-                                        </p:attrNameLst>
-                                      </p:cBhvr>
-                                      <p:to>
-                                        <p:strVal val="visible"/>
-                                      </p:to>
-                                    </p:set>
-                                  </p:childTnLst>
-                                </p:cTn>
-                              </p:par>
-                              <p:par>
-                                <p:cTn id="21" presetID="1" presetClass="entr" presetSubtype="0" fill="hold" grpId="0" nodeType="withEffect">
-                                  <p:stCondLst>
-                                    <p:cond delay="0"/>
-                                  </p:stCondLst>
-                                  <p:childTnLst>
-                                    <p:set>
-                                      <p:cBhvr>
-                                        <p:cTn id="22" dur="1" fill="hold">
-                                          <p:stCondLst>
-                                            <p:cond delay="0"/>
-                                          </p:stCondLst>
-                                        </p:cTn>
-                                        <p:tgtEl>
-                                          <p:spTgt spid="4">
-                                            <p:txEl>
-                                              <p:pRg st="6" end="6"/>
-                                            </p:txEl>
-                                          </p:spTgt>
-                                        </p:tgtEl>
-                                        <p:attrNameLst>
-                                          <p:attrName>style.visibility</p:attrName>
-                                        </p:attrNameLst>
-                                      </p:cBhvr>
-                                      <p:to>
-                                        <p:strVal val="visible"/>
-                                      </p:to>
-                                    </p:set>
-                                  </p:childTnLst>
-                                </p:cTn>
-                              </p:par>
-                            </p:childTnLst>
-                          </p:cTn>
-                        </p:par>
-                      </p:childTnLst>
-                    </p:cTn>
-                  </p:par>
-                  <p:par>
-                    <p:cTn id="23" fill="hold">
-                      <p:stCondLst>
-                        <p:cond delay="indefinite"/>
-                      </p:stCondLst>
-                      <p:childTnLst>
-                        <p:par>
-                          <p:cTn id="24" fill="hold">
-                            <p:stCondLst>
-                              <p:cond delay="0"/>
-                            </p:stCondLst>
-                            <p:childTnLst>
-                              <p:par>
-                                <p:cTn id="25" presetID="1" presetClass="entr" presetSubtype="0" fill="hold" nodeType="clickEffect">
-                                  <p:stCondLst>
-                                    <p:cond delay="0"/>
-                                  </p:stCondLst>
-                                  <p:childTnLst>
-                                    <p:set>
-                                      <p:cBhvr>
-                                        <p:cTn id="26" dur="1" fill="hold">
-                                          <p:stCondLst>
-                                            <p:cond delay="0"/>
-                                          </p:stCondLst>
-                                        </p:cTn>
-                                        <p:tgtEl>
-                                          <p:spTgt spid="1026"/>
-                                        </p:tgtEl>
-                                        <p:attrNameLst>
-                                          <p:attrName>style.visibility</p:attrName>
-                                        </p:attrNameLst>
-                                      </p:cBhvr>
-                                      <p:to>
-                                        <p:strVal val="visible"/>
-                                      </p:to>
-                                    </p:set>
-                                  </p:childTnLst>
-                                </p:cTn>
-                              </p:par>
-                            </p:childTnLst>
-                          </p:cTn>
-                        </p:par>
-                      </p:childTnLst>
-                    </p:cTn>
-                  </p:par>
-                </p:childTnLst>
-              </p:cTn>
-              <p:prevCondLst>
-                <p:cond evt="onPrev" delay="0">
-                  <p:tgtEl>
-                    <p:sldTgt/>
-                  </p:tgtEl>
-                </p:cond>
-              </p:prevCondLst>
-              <p:nextCondLst>
-                <p:cond evt="onNext" delay="0">
-                  <p:tgtEl>
-                    <p:sldTgt/>
-                  </p:tgtEl>
-                </p:cond>
-              </p:nextCondLst>
-            </p:seq>
-          </p:childTnLst>
-        </p:cTn>
+        <p:cTn id="1" dur="indefinite" restart="never" nodeType="tmRoot"/>
       </p:par>
     </p:tnLst>
-    <p:bldLst>
-      <p:bldP spid="4" grpId="0" build="p"/>
-    </p:bldLst>
   </p:timing>
 </p:sld>
 </file>
@@ -21897,204 +21821,6 @@
       </p:grpSpPr>
       <p:sp>
         <p:nvSpPr>
-          <p:cNvPr id="8" name="Объект 7"/>
-          <p:cNvSpPr>
-            <a:spLocks noGrp="1"/>
-          </p:cNvSpPr>
-          <p:nvPr>
-            <p:ph idx="1"/>
-          </p:nvPr>
-        </p:nvSpPr>
-        <p:spPr>
-          <a:xfrm>
-            <a:off x="347330" y="1853966"/>
-            <a:ext cx="8420986" cy="5004033"/>
-          </a:xfrm>
-        </p:spPr>
-        <p:txBody>
-          <a:bodyPr>
-            <a:normAutofit/>
-          </a:bodyPr>
-          <a:lstStyle/>
-          <a:p>
-            <a:pPr marL="0" indent="0">
-              <a:buNone/>
-            </a:pPr>
-            <a:r>
-              <a:rPr lang="en-US" dirty="0" smtClean="0"/>
-              <a:t>SOLID</a:t>
-            </a:r>
-            <a:r>
-              <a:rPr lang="ru-RU" dirty="0" smtClean="0"/>
-              <a:t> полезен</a:t>
-            </a:r>
-            <a:r>
-              <a:rPr lang="ru-RU" dirty="0"/>
-              <a:t>,</a:t>
-            </a:r>
-            <a:endParaRPr lang="ru-RU" dirty="0" smtClean="0"/>
-          </a:p>
-          <a:p>
-            <a:pPr marL="0" indent="0">
-              <a:buNone/>
-            </a:pPr>
-            <a:r>
-              <a:rPr lang="ru-RU" dirty="0" smtClean="0"/>
-              <a:t>	но </a:t>
-            </a:r>
-            <a:r>
-              <a:rPr lang="ru-RU" i="1" dirty="0" smtClean="0"/>
-              <a:t>чаще </a:t>
-            </a:r>
-            <a:r>
-              <a:rPr lang="en-US" dirty="0" smtClean="0"/>
-              <a:t>FP</a:t>
-            </a:r>
-            <a:r>
-              <a:rPr lang="ru-RU" dirty="0" smtClean="0"/>
-              <a:t> делает код чище!</a:t>
-            </a:r>
-          </a:p>
-        </p:txBody>
-      </p:sp>
-      <p:sp>
-        <p:nvSpPr>
-          <p:cNvPr id="11" name="Заголовок 6"/>
-          <p:cNvSpPr>
-            <a:spLocks noGrp="1"/>
-          </p:cNvSpPr>
-          <p:nvPr>
-            <p:ph type="title"/>
-          </p:nvPr>
-        </p:nvSpPr>
-        <p:spPr/>
-        <p:txBody>
-          <a:bodyPr/>
-          <a:lstStyle/>
-          <a:p>
-            <a:r>
-              <a:rPr lang="en-US" dirty="0"/>
-              <a:t>Functional </a:t>
-            </a:r>
-            <a:r>
-              <a:rPr lang="en-US" dirty="0" smtClean="0"/>
-              <a:t>vs SOLID</a:t>
-            </a:r>
-            <a:endParaRPr lang="ru-RU" dirty="0"/>
-          </a:p>
-        </p:txBody>
-      </p:sp>
-    </p:spTree>
-    <p:extLst>
-      <p:ext uri="{BB962C8B-B14F-4D97-AF65-F5344CB8AC3E}">
-        <p14:creationId xmlns:p14="http://schemas.microsoft.com/office/powerpoint/2010/main" val="691198416"/>
-      </p:ext>
-    </p:extLst>
-  </p:cSld>
-  <p:clrMapOvr>
-    <a:masterClrMapping/>
-  </p:clrMapOvr>
-  <p:timing>
-    <p:tnLst>
-      <p:par>
-        <p:cTn id="1" dur="indefinite" restart="never" nodeType="tmRoot">
-          <p:childTnLst>
-            <p:seq concurrent="1" nextAc="seek">
-              <p:cTn id="2" dur="indefinite" nodeType="mainSeq">
-                <p:childTnLst>
-                  <p:par>
-                    <p:cTn id="3" fill="hold">
-                      <p:stCondLst>
-                        <p:cond delay="indefinite"/>
-                      </p:stCondLst>
-                      <p:childTnLst>
-                        <p:par>
-                          <p:cTn id="4" fill="hold">
-                            <p:stCondLst>
-                              <p:cond delay="0"/>
-                            </p:stCondLst>
-                            <p:childTnLst>
-                              <p:par>
-                                <p:cTn id="5" presetID="1" presetClass="entr" presetSubtype="0" fill="hold" nodeType="clickEffect">
-                                  <p:stCondLst>
-                                    <p:cond delay="0"/>
-                                  </p:stCondLst>
-                                  <p:childTnLst>
-                                    <p:set>
-                                      <p:cBhvr>
-                                        <p:cTn id="6" dur="1" fill="hold">
-                                          <p:stCondLst>
-                                            <p:cond delay="0"/>
-                                          </p:stCondLst>
-                                        </p:cTn>
-                                        <p:tgtEl>
-                                          <p:spTgt spid="8">
-                                            <p:txEl>
-                                              <p:pRg st="1" end="1"/>
-                                            </p:txEl>
-                                          </p:spTgt>
-                                        </p:tgtEl>
-                                        <p:attrNameLst>
-                                          <p:attrName>style.visibility</p:attrName>
-                                        </p:attrNameLst>
-                                      </p:cBhvr>
-                                      <p:to>
-                                        <p:strVal val="visible"/>
-                                      </p:to>
-                                    </p:set>
-                                  </p:childTnLst>
-                                </p:cTn>
-                              </p:par>
-                            </p:childTnLst>
-                          </p:cTn>
-                        </p:par>
-                      </p:childTnLst>
-                    </p:cTn>
-                  </p:par>
-                </p:childTnLst>
-              </p:cTn>
-              <p:prevCondLst>
-                <p:cond evt="onPrev" delay="0">
-                  <p:tgtEl>
-                    <p:sldTgt/>
-                  </p:tgtEl>
-                </p:cond>
-              </p:prevCondLst>
-              <p:nextCondLst>
-                <p:cond evt="onNext" delay="0">
-                  <p:tgtEl>
-                    <p:sldTgt/>
-                  </p:tgtEl>
-                </p:cond>
-              </p:nextCondLst>
-            </p:seq>
-          </p:childTnLst>
-        </p:cTn>
-      </p:par>
-    </p:tnLst>
-  </p:timing>
-</p:sld>
-</file>
-
-<file path=ppt/slides/slide36.xml><?xml version="1.0" encoding="utf-8"?>
-<p:sld xmlns:a="http://schemas.openxmlformats.org/drawingml/2006/main" xmlns:r="http://schemas.openxmlformats.org/officeDocument/2006/relationships" xmlns:p="http://schemas.openxmlformats.org/presentationml/2006/main">
-  <p:cSld>
-    <p:spTree>
-      <p:nvGrpSpPr>
-        <p:cNvPr id="1" name=""/>
-        <p:cNvGrpSpPr/>
-        <p:nvPr/>
-      </p:nvGrpSpPr>
-      <p:grpSpPr>
-        <a:xfrm>
-          <a:off x="0" y="0"/>
-          <a:ext cx="0" cy="0"/>
-          <a:chOff x="0" y="0"/>
-          <a:chExt cx="0" cy="0"/>
-        </a:xfrm>
-      </p:grpSpPr>
-      <p:sp>
-        <p:nvSpPr>
           <p:cNvPr id="4" name="Заголовок 3"/>
           <p:cNvSpPr>
             <a:spLocks noGrp="1"/>
@@ -22157,7 +21883,7 @@
 </p:sld>
 </file>
 
-<file path=ppt/slides/slide37.xml><?xml version="1.0" encoding="utf-8"?>
+<file path=ppt/slides/slide36.xml><?xml version="1.0" encoding="utf-8"?>
 <p:sld xmlns:a="http://schemas.openxmlformats.org/drawingml/2006/main" xmlns:r="http://schemas.openxmlformats.org/officeDocument/2006/relationships" xmlns:p="http://schemas.openxmlformats.org/presentationml/2006/main">
   <p:cSld>
     <p:spTree>
@@ -22274,7 +22000,7 @@
 </p:sld>
 </file>
 
-<file path=ppt/slides/slide38.xml><?xml version="1.0" encoding="utf-8"?>
+<file path=ppt/slides/slide37.xml><?xml version="1.0" encoding="utf-8"?>
 <p:sld xmlns:a="http://schemas.openxmlformats.org/drawingml/2006/main" xmlns:r="http://schemas.openxmlformats.org/officeDocument/2006/relationships" xmlns:p="http://schemas.openxmlformats.org/presentationml/2006/main">
   <p:cSld>
     <p:spTree>
@@ -22793,7 +22519,7 @@
 </p:sld>
 </file>
 
-<file path=ppt/slides/slide39.xml><?xml version="1.0" encoding="utf-8"?>
+<file path=ppt/slides/slide38.xml><?xml version="1.0" encoding="utf-8"?>
 <p:sld xmlns:a="http://schemas.openxmlformats.org/drawingml/2006/main" xmlns:r="http://schemas.openxmlformats.org/officeDocument/2006/relationships" xmlns:p="http://schemas.openxmlformats.org/presentationml/2006/main">
   <p:cSld>
     <p:spTree>
@@ -23099,644 +22825,7 @@
 </p:sld>
 </file>
 
-<file path=ppt/slides/slide4.xml><?xml version="1.0" encoding="utf-8"?>
-<p:sld xmlns:a="http://schemas.openxmlformats.org/drawingml/2006/main" xmlns:r="http://schemas.openxmlformats.org/officeDocument/2006/relationships" xmlns:p="http://schemas.openxmlformats.org/presentationml/2006/main">
-  <p:cSld>
-    <p:spTree>
-      <p:nvGrpSpPr>
-        <p:cNvPr id="1" name=""/>
-        <p:cNvGrpSpPr/>
-        <p:nvPr/>
-      </p:nvGrpSpPr>
-      <p:grpSpPr>
-        <a:xfrm>
-          <a:off x="0" y="0"/>
-          <a:ext cx="0" cy="0"/>
-          <a:chOff x="0" y="0"/>
-          <a:chExt cx="0" cy="0"/>
-        </a:xfrm>
-      </p:grpSpPr>
-      <p:sp>
-        <p:nvSpPr>
-          <p:cNvPr id="5" name="Заголовок 1"/>
-          <p:cNvSpPr>
-            <a:spLocks noGrp="1"/>
-          </p:cNvSpPr>
-          <p:nvPr>
-            <p:ph type="title"/>
-          </p:nvPr>
-        </p:nvSpPr>
-        <p:spPr/>
-        <p:txBody>
-          <a:bodyPr/>
-          <a:lstStyle/>
-          <a:p>
-            <a:r>
-              <a:rPr lang="en-US" dirty="0" smtClean="0"/>
-              <a:t>1. </a:t>
-            </a:r>
-            <a:r>
-              <a:rPr lang="ru-RU" dirty="0" smtClean="0"/>
-              <a:t>Сгенерировать карту</a:t>
-            </a:r>
-            <a:endParaRPr lang="ru-RU" dirty="0"/>
-          </a:p>
-        </p:txBody>
-      </p:sp>
-      <p:sp>
-        <p:nvSpPr>
-          <p:cNvPr id="4" name="Объект 3"/>
-          <p:cNvSpPr>
-            <a:spLocks noGrp="1"/>
-          </p:cNvSpPr>
-          <p:nvPr>
-            <p:ph idx="1"/>
-          </p:nvPr>
-        </p:nvSpPr>
-        <p:spPr/>
-        <p:txBody>
-          <a:bodyPr>
-            <a:noAutofit/>
-          </a:bodyPr>
-          <a:lstStyle/>
-          <a:p>
-            <a:pPr marL="0" indent="0">
-              <a:lnSpc>
-                <a:spcPct val="70000"/>
-              </a:lnSpc>
-              <a:buNone/>
-            </a:pPr>
-            <a:r>
-              <a:rPr lang="en-US" sz="2000" dirty="0">
-                <a:solidFill>
-                  <a:srgbClr val="0000FF"/>
-                </a:solidFill>
-                <a:highlight>
-                  <a:srgbClr val="FFFFFF"/>
-                </a:highlight>
-                <a:latin typeface="Consolas" panose="020B0609020204030204" pitchFamily="49" charset="0"/>
-              </a:rPr>
-              <a:t>public</a:t>
-            </a:r>
-            <a:r>
-              <a:rPr lang="en-US" sz="2000" dirty="0">
-                <a:solidFill>
-                  <a:srgbClr val="000000"/>
-                </a:solidFill>
-                <a:highlight>
-                  <a:srgbClr val="FFFFFF"/>
-                </a:highlight>
-                <a:latin typeface="Consolas" panose="020B0609020204030204" pitchFamily="49" charset="0"/>
-              </a:rPr>
-              <a:t> </a:t>
-            </a:r>
-            <a:r>
-              <a:rPr lang="en-US" sz="2000" dirty="0">
-                <a:solidFill>
-                  <a:srgbClr val="0000FF"/>
-                </a:solidFill>
-                <a:highlight>
-                  <a:srgbClr val="FFFFFF"/>
-                </a:highlight>
-                <a:latin typeface="Consolas" panose="020B0609020204030204" pitchFamily="49" charset="0"/>
-              </a:rPr>
-              <a:t>class</a:t>
-            </a:r>
-            <a:r>
-              <a:rPr lang="en-US" sz="2000" dirty="0">
-                <a:solidFill>
-                  <a:srgbClr val="000000"/>
-                </a:solidFill>
-                <a:highlight>
-                  <a:srgbClr val="FFFFFF"/>
-                </a:highlight>
-                <a:latin typeface="Consolas" panose="020B0609020204030204" pitchFamily="49" charset="0"/>
-              </a:rPr>
-              <a:t> </a:t>
-            </a:r>
-            <a:r>
-              <a:rPr lang="en-US" sz="2000" dirty="0">
-                <a:solidFill>
-                  <a:srgbClr val="2B91AF"/>
-                </a:solidFill>
-                <a:highlight>
-                  <a:srgbClr val="FFFFFF"/>
-                </a:highlight>
-                <a:latin typeface="Consolas" panose="020B0609020204030204" pitchFamily="49" charset="0"/>
-              </a:rPr>
-              <a:t>Game</a:t>
-            </a:r>
-            <a:r>
-              <a:rPr lang="en-US" sz="2000" dirty="0">
-                <a:solidFill>
-                  <a:srgbClr val="000000"/>
-                </a:solidFill>
-                <a:highlight>
-                  <a:srgbClr val="FFFFFF"/>
-                </a:highlight>
-                <a:latin typeface="Consolas" panose="020B0609020204030204" pitchFamily="49" charset="0"/>
-              </a:rPr>
-              <a:t> </a:t>
-            </a:r>
-            <a:r>
-              <a:rPr lang="ru-RU" sz="2000" dirty="0" smtClean="0">
-                <a:solidFill>
-                  <a:srgbClr val="000000"/>
-                </a:solidFill>
-                <a:highlight>
-                  <a:srgbClr val="FFFFFF"/>
-                </a:highlight>
-                <a:latin typeface="Consolas" panose="020B0609020204030204" pitchFamily="49" charset="0"/>
-              </a:rPr>
-              <a:t>{</a:t>
-            </a:r>
-            <a:endParaRPr lang="ru-RU" sz="2000" dirty="0">
-              <a:solidFill>
-                <a:srgbClr val="000000"/>
-              </a:solidFill>
-              <a:highlight>
-                <a:srgbClr val="FFFFFF"/>
-              </a:highlight>
-              <a:latin typeface="Consolas" panose="020B0609020204030204" pitchFamily="49" charset="0"/>
-            </a:endParaRPr>
-          </a:p>
-          <a:p>
-            <a:pPr marL="0" indent="0">
-              <a:lnSpc>
-                <a:spcPct val="70000"/>
-              </a:lnSpc>
-              <a:buNone/>
-            </a:pPr>
-            <a:r>
-              <a:rPr lang="en-US" sz="2000" dirty="0">
-                <a:solidFill>
-                  <a:srgbClr val="000000"/>
-                </a:solidFill>
-                <a:highlight>
-                  <a:srgbClr val="FFFFFF"/>
-                </a:highlight>
-                <a:latin typeface="Consolas" panose="020B0609020204030204" pitchFamily="49" charset="0"/>
-              </a:rPr>
-              <a:t>    </a:t>
-            </a:r>
-            <a:r>
-              <a:rPr lang="en-US" sz="2000" dirty="0">
-                <a:solidFill>
-                  <a:srgbClr val="0000FF"/>
-                </a:solidFill>
-                <a:highlight>
-                  <a:srgbClr val="FFFFFF"/>
-                </a:highlight>
-                <a:latin typeface="Consolas" panose="020B0609020204030204" pitchFamily="49" charset="0"/>
-              </a:rPr>
-              <a:t>private</a:t>
-            </a:r>
-            <a:r>
-              <a:rPr lang="en-US" sz="2000" dirty="0">
-                <a:solidFill>
-                  <a:srgbClr val="000000"/>
-                </a:solidFill>
-                <a:highlight>
-                  <a:srgbClr val="FFFFFF"/>
-                </a:highlight>
-                <a:latin typeface="Consolas" panose="020B0609020204030204" pitchFamily="49" charset="0"/>
-              </a:rPr>
-              <a:t> </a:t>
-            </a:r>
-            <a:r>
-              <a:rPr lang="en-US" sz="2000" dirty="0" err="1">
-                <a:solidFill>
-                  <a:srgbClr val="0000FF"/>
-                </a:solidFill>
-                <a:highlight>
-                  <a:srgbClr val="FFFFFF"/>
-                </a:highlight>
-                <a:latin typeface="Consolas" panose="020B0609020204030204" pitchFamily="49" charset="0"/>
-              </a:rPr>
-              <a:t>readonly</a:t>
-            </a:r>
-            <a:r>
-              <a:rPr lang="en-US" sz="2000" dirty="0">
-                <a:solidFill>
-                  <a:srgbClr val="000000"/>
-                </a:solidFill>
-                <a:highlight>
-                  <a:srgbClr val="FFFFFF"/>
-                </a:highlight>
-                <a:latin typeface="Consolas" panose="020B0609020204030204" pitchFamily="49" charset="0"/>
-              </a:rPr>
-              <a:t> </a:t>
-            </a:r>
-            <a:r>
-              <a:rPr lang="en-US" sz="2000" dirty="0" err="1" smtClean="0">
-                <a:solidFill>
-                  <a:srgbClr val="2B91AF"/>
-                </a:solidFill>
-                <a:highlight>
-                  <a:srgbClr val="FFFFFF"/>
-                </a:highlight>
-                <a:latin typeface="Consolas" panose="020B0609020204030204" pitchFamily="49" charset="0"/>
-              </a:rPr>
-              <a:t>IMapProvider</a:t>
-            </a:r>
-            <a:r>
-              <a:rPr lang="en-US" sz="2000" dirty="0" smtClean="0">
-                <a:solidFill>
-                  <a:srgbClr val="000000"/>
-                </a:solidFill>
-                <a:highlight>
-                  <a:srgbClr val="FFFFFF"/>
-                </a:highlight>
-                <a:latin typeface="Consolas" panose="020B0609020204030204" pitchFamily="49" charset="0"/>
-              </a:rPr>
-              <a:t> </a:t>
-            </a:r>
-            <a:r>
-              <a:rPr lang="en-US" sz="2000" dirty="0" err="1" smtClean="0">
-                <a:solidFill>
-                  <a:srgbClr val="000000"/>
-                </a:solidFill>
-                <a:highlight>
-                  <a:srgbClr val="FFFFFF"/>
-                </a:highlight>
-                <a:latin typeface="Consolas" panose="020B0609020204030204" pitchFamily="49" charset="0"/>
-              </a:rPr>
-              <a:t>mapProvider</a:t>
-            </a:r>
-            <a:r>
-              <a:rPr lang="en-US" sz="2000" dirty="0" smtClean="0">
-                <a:solidFill>
-                  <a:srgbClr val="000000"/>
-                </a:solidFill>
-                <a:highlight>
-                  <a:srgbClr val="FFFFFF"/>
-                </a:highlight>
-                <a:latin typeface="Consolas" panose="020B0609020204030204" pitchFamily="49" charset="0"/>
-              </a:rPr>
-              <a:t>;</a:t>
-            </a:r>
-            <a:endParaRPr lang="en-US" sz="2000" dirty="0">
-              <a:solidFill>
-                <a:srgbClr val="000000"/>
-              </a:solidFill>
-              <a:highlight>
-                <a:srgbClr val="FFFFFF"/>
-              </a:highlight>
-              <a:latin typeface="Consolas" panose="020B0609020204030204" pitchFamily="49" charset="0"/>
-            </a:endParaRPr>
-          </a:p>
-          <a:p>
-            <a:pPr marL="0" indent="0">
-              <a:lnSpc>
-                <a:spcPct val="70000"/>
-              </a:lnSpc>
-              <a:buNone/>
-            </a:pPr>
-            <a:endParaRPr lang="ru-RU" sz="2000" dirty="0">
-              <a:solidFill>
-                <a:srgbClr val="000000"/>
-              </a:solidFill>
-              <a:highlight>
-                <a:srgbClr val="FFFFFF"/>
-              </a:highlight>
-              <a:latin typeface="Consolas" panose="020B0609020204030204" pitchFamily="49" charset="0"/>
-            </a:endParaRPr>
-          </a:p>
-          <a:p>
-            <a:pPr marL="0" indent="0">
-              <a:lnSpc>
-                <a:spcPct val="70000"/>
-              </a:lnSpc>
-              <a:buNone/>
-            </a:pPr>
-            <a:r>
-              <a:rPr lang="en-US" sz="2000" dirty="0">
-                <a:solidFill>
-                  <a:srgbClr val="000000"/>
-                </a:solidFill>
-                <a:highlight>
-                  <a:srgbClr val="FFFFFF"/>
-                </a:highlight>
-                <a:latin typeface="Consolas" panose="020B0609020204030204" pitchFamily="49" charset="0"/>
-              </a:rPr>
-              <a:t>    </a:t>
-            </a:r>
-            <a:r>
-              <a:rPr lang="en-US" sz="2000" dirty="0">
-                <a:solidFill>
-                  <a:srgbClr val="0000FF"/>
-                </a:solidFill>
-                <a:highlight>
-                  <a:srgbClr val="FFFFFF"/>
-                </a:highlight>
-                <a:latin typeface="Consolas" panose="020B0609020204030204" pitchFamily="49" charset="0"/>
-              </a:rPr>
-              <a:t>public</a:t>
-            </a:r>
-            <a:r>
-              <a:rPr lang="en-US" sz="2000" dirty="0">
-                <a:solidFill>
-                  <a:srgbClr val="000000"/>
-                </a:solidFill>
-                <a:highlight>
-                  <a:srgbClr val="FFFFFF"/>
-                </a:highlight>
-                <a:latin typeface="Consolas" panose="020B0609020204030204" pitchFamily="49" charset="0"/>
-              </a:rPr>
-              <a:t> </a:t>
-            </a:r>
-            <a:r>
-              <a:rPr lang="en-US" sz="2000" dirty="0" smtClean="0">
-                <a:solidFill>
-                  <a:srgbClr val="000000"/>
-                </a:solidFill>
-                <a:highlight>
-                  <a:srgbClr val="FFFFFF"/>
-                </a:highlight>
-                <a:latin typeface="Consolas" panose="020B0609020204030204" pitchFamily="49" charset="0"/>
-              </a:rPr>
-              <a:t>Game(</a:t>
-            </a:r>
-            <a:r>
-              <a:rPr lang="en-US" sz="2000" dirty="0" err="1" smtClean="0">
-                <a:solidFill>
-                  <a:srgbClr val="2B91AF"/>
-                </a:solidFill>
-                <a:highlight>
-                  <a:srgbClr val="FFFFFF"/>
-                </a:highlight>
-                <a:latin typeface="Consolas" panose="020B0609020204030204" pitchFamily="49" charset="0"/>
-              </a:rPr>
-              <a:t>IMapProvider</a:t>
-            </a:r>
-            <a:r>
-              <a:rPr lang="en-US" sz="2000" dirty="0" smtClean="0">
-                <a:solidFill>
-                  <a:srgbClr val="000000"/>
-                </a:solidFill>
-                <a:highlight>
-                  <a:srgbClr val="FFFFFF"/>
-                </a:highlight>
-                <a:latin typeface="Consolas" panose="020B0609020204030204" pitchFamily="49" charset="0"/>
-              </a:rPr>
-              <a:t> </a:t>
-            </a:r>
-            <a:r>
-              <a:rPr lang="en-US" sz="2000" dirty="0" err="1" smtClean="0">
-                <a:solidFill>
-                  <a:srgbClr val="000000"/>
-                </a:solidFill>
-                <a:highlight>
-                  <a:srgbClr val="FFFFFF"/>
-                </a:highlight>
-                <a:latin typeface="Consolas" panose="020B0609020204030204" pitchFamily="49" charset="0"/>
-              </a:rPr>
-              <a:t>mapProvider</a:t>
-            </a:r>
-            <a:r>
-              <a:rPr lang="en-US" sz="2000" dirty="0" smtClean="0">
-                <a:solidFill>
-                  <a:srgbClr val="000000"/>
-                </a:solidFill>
-                <a:highlight>
-                  <a:srgbClr val="FFFFFF"/>
-                </a:highlight>
-                <a:latin typeface="Consolas" panose="020B0609020204030204" pitchFamily="49" charset="0"/>
-              </a:rPr>
-              <a:t>) </a:t>
-            </a:r>
-            <a:r>
-              <a:rPr lang="ru-RU" sz="2000" dirty="0" smtClean="0">
-                <a:solidFill>
-                  <a:srgbClr val="000000"/>
-                </a:solidFill>
-                <a:highlight>
-                  <a:srgbClr val="FFFFFF"/>
-                </a:highlight>
-                <a:latin typeface="Consolas" panose="020B0609020204030204" pitchFamily="49" charset="0"/>
-              </a:rPr>
-              <a:t>{</a:t>
-            </a:r>
-            <a:endParaRPr lang="ru-RU" sz="2000" dirty="0">
-              <a:solidFill>
-                <a:srgbClr val="000000"/>
-              </a:solidFill>
-              <a:highlight>
-                <a:srgbClr val="FFFFFF"/>
-              </a:highlight>
-              <a:latin typeface="Consolas" panose="020B0609020204030204" pitchFamily="49" charset="0"/>
-            </a:endParaRPr>
-          </a:p>
-          <a:p>
-            <a:pPr marL="0" indent="0">
-              <a:lnSpc>
-                <a:spcPct val="70000"/>
-              </a:lnSpc>
-              <a:buNone/>
-            </a:pPr>
-            <a:r>
-              <a:rPr lang="en-US" sz="2000" dirty="0">
-                <a:solidFill>
-                  <a:srgbClr val="000000"/>
-                </a:solidFill>
-                <a:highlight>
-                  <a:srgbClr val="FFFFFF"/>
-                </a:highlight>
-                <a:latin typeface="Consolas" panose="020B0609020204030204" pitchFamily="49" charset="0"/>
-              </a:rPr>
-              <a:t>        </a:t>
-            </a:r>
-            <a:r>
-              <a:rPr lang="en-US" sz="2000" dirty="0" err="1" smtClean="0">
-                <a:solidFill>
-                  <a:srgbClr val="0000FF"/>
-                </a:solidFill>
-                <a:highlight>
-                  <a:srgbClr val="FFFFFF"/>
-                </a:highlight>
-                <a:latin typeface="Consolas" panose="020B0609020204030204" pitchFamily="49" charset="0"/>
-              </a:rPr>
-              <a:t>this</a:t>
-            </a:r>
-            <a:r>
-              <a:rPr lang="en-US" sz="2000" dirty="0" err="1" smtClean="0">
-                <a:solidFill>
-                  <a:srgbClr val="000000"/>
-                </a:solidFill>
-                <a:highlight>
-                  <a:srgbClr val="FFFFFF"/>
-                </a:highlight>
-                <a:latin typeface="Consolas" panose="020B0609020204030204" pitchFamily="49" charset="0"/>
-              </a:rPr>
-              <a:t>.map</a:t>
-            </a:r>
-            <a:r>
-              <a:rPr lang="en-US" sz="2000" dirty="0" err="1">
-                <a:solidFill>
-                  <a:srgbClr val="000000"/>
-                </a:solidFill>
-                <a:highlight>
-                  <a:srgbClr val="FFFFFF"/>
-                </a:highlight>
-                <a:latin typeface="Consolas" panose="020B0609020204030204" pitchFamily="49" charset="0"/>
-              </a:rPr>
-              <a:t>Provider</a:t>
-            </a:r>
-            <a:r>
-              <a:rPr lang="en-US" sz="2000" dirty="0" smtClean="0">
-                <a:solidFill>
-                  <a:srgbClr val="000000"/>
-                </a:solidFill>
-                <a:highlight>
-                  <a:srgbClr val="FFFFFF"/>
-                </a:highlight>
-                <a:latin typeface="Consolas" panose="020B0609020204030204" pitchFamily="49" charset="0"/>
-              </a:rPr>
-              <a:t> </a:t>
-            </a:r>
-            <a:r>
-              <a:rPr lang="en-US" sz="2000" dirty="0">
-                <a:solidFill>
-                  <a:srgbClr val="000000"/>
-                </a:solidFill>
-                <a:highlight>
-                  <a:srgbClr val="FFFFFF"/>
-                </a:highlight>
-                <a:latin typeface="Consolas" panose="020B0609020204030204" pitchFamily="49" charset="0"/>
-              </a:rPr>
-              <a:t>= </a:t>
-            </a:r>
-            <a:r>
-              <a:rPr lang="en-US" sz="2000" dirty="0" err="1" smtClean="0">
-                <a:solidFill>
-                  <a:srgbClr val="000000"/>
-                </a:solidFill>
-                <a:highlight>
-                  <a:srgbClr val="FFFFFF"/>
-                </a:highlight>
-                <a:latin typeface="Consolas" panose="020B0609020204030204" pitchFamily="49" charset="0"/>
-              </a:rPr>
-              <a:t>map</a:t>
-            </a:r>
-            <a:r>
-              <a:rPr lang="en-US" sz="2000" dirty="0" err="1">
-                <a:solidFill>
-                  <a:srgbClr val="000000"/>
-                </a:solidFill>
-                <a:highlight>
-                  <a:srgbClr val="FFFFFF"/>
-                </a:highlight>
-                <a:latin typeface="Consolas" panose="020B0609020204030204" pitchFamily="49" charset="0"/>
-              </a:rPr>
-              <a:t>Provider</a:t>
-            </a:r>
-            <a:r>
-              <a:rPr lang="en-US" sz="2000" dirty="0" smtClean="0">
-                <a:solidFill>
-                  <a:srgbClr val="000000"/>
-                </a:solidFill>
-                <a:highlight>
-                  <a:srgbClr val="FFFFFF"/>
-                </a:highlight>
-                <a:latin typeface="Consolas" panose="020B0609020204030204" pitchFamily="49" charset="0"/>
-              </a:rPr>
-              <a:t>;</a:t>
-            </a:r>
-            <a:endParaRPr lang="en-US" sz="2000" dirty="0">
-              <a:solidFill>
-                <a:srgbClr val="000000"/>
-              </a:solidFill>
-              <a:highlight>
-                <a:srgbClr val="FFFFFF"/>
-              </a:highlight>
-              <a:latin typeface="Consolas" panose="020B0609020204030204" pitchFamily="49" charset="0"/>
-            </a:endParaRPr>
-          </a:p>
-          <a:p>
-            <a:pPr marL="0" indent="0">
-              <a:lnSpc>
-                <a:spcPct val="70000"/>
-              </a:lnSpc>
-              <a:buNone/>
-            </a:pPr>
-            <a:r>
-              <a:rPr lang="en-US" sz="2000" dirty="0" smtClean="0">
-                <a:solidFill>
-                  <a:srgbClr val="000000"/>
-                </a:solidFill>
-                <a:highlight>
-                  <a:srgbClr val="FFFFFF"/>
-                </a:highlight>
-                <a:latin typeface="Consolas" panose="020B0609020204030204" pitchFamily="49" charset="0"/>
-              </a:rPr>
-              <a:t>    </a:t>
-            </a:r>
-            <a:r>
-              <a:rPr lang="ru-RU" sz="2000" dirty="0" smtClean="0">
-                <a:solidFill>
-                  <a:srgbClr val="000000"/>
-                </a:solidFill>
-                <a:highlight>
-                  <a:srgbClr val="FFFFFF"/>
-                </a:highlight>
-                <a:latin typeface="Consolas" panose="020B0609020204030204" pitchFamily="49" charset="0"/>
-              </a:rPr>
-              <a:t>}</a:t>
-            </a:r>
-            <a:endParaRPr lang="ru-RU" sz="2000" dirty="0">
-              <a:solidFill>
-                <a:srgbClr val="000000"/>
-              </a:solidFill>
-              <a:highlight>
-                <a:srgbClr val="FFFFFF"/>
-              </a:highlight>
-              <a:latin typeface="Consolas" panose="020B0609020204030204" pitchFamily="49" charset="0"/>
-            </a:endParaRPr>
-          </a:p>
-          <a:p>
-            <a:pPr marL="0" indent="0">
-              <a:lnSpc>
-                <a:spcPct val="70000"/>
-              </a:lnSpc>
-              <a:buNone/>
-            </a:pPr>
-            <a:r>
-              <a:rPr lang="ru-RU" sz="2000" dirty="0" smtClean="0">
-                <a:solidFill>
-                  <a:srgbClr val="000000"/>
-                </a:solidFill>
-                <a:highlight>
-                  <a:srgbClr val="FFFFFF"/>
-                </a:highlight>
-                <a:latin typeface="Consolas" panose="020B0609020204030204" pitchFamily="49" charset="0"/>
-              </a:rPr>
-              <a:t>}</a:t>
-            </a:r>
-            <a:endParaRPr lang="ru-RU" sz="2000" dirty="0"/>
-          </a:p>
-        </p:txBody>
-      </p:sp>
-    </p:spTree>
-    <p:extLst>
-      <p:ext uri="{BB962C8B-B14F-4D97-AF65-F5344CB8AC3E}">
-        <p14:creationId xmlns:p14="http://schemas.microsoft.com/office/powerpoint/2010/main" val="2474282276"/>
-      </p:ext>
-    </p:extLst>
-  </p:cSld>
-  <p:clrMapOvr>
-    <a:masterClrMapping/>
-  </p:clrMapOvr>
-  <p:timing>
-    <p:tnLst>
-      <p:par>
-        <p:cTn id="1" dur="indefinite" restart="never" nodeType="tmRoot"/>
-      </p:par>
-    </p:tnLst>
-  </p:timing>
-</p:sld>
-</file>
-
-<file path=ppt/slides/slide40.xml><?xml version="1.0" encoding="utf-8"?>
+<file path=ppt/slides/slide39.xml><?xml version="1.0" encoding="utf-8"?>
 <p:sld xmlns:a="http://schemas.openxmlformats.org/drawingml/2006/main" xmlns:r="http://schemas.openxmlformats.org/officeDocument/2006/relationships" xmlns:p="http://schemas.openxmlformats.org/presentationml/2006/main">
   <p:cSld>
     <p:spTree>
@@ -24047,7 +23136,644 @@
 </p:sld>
 </file>
 
-<file path=ppt/slides/slide41.xml><?xml version="1.0" encoding="utf-8"?>
+<file path=ppt/slides/slide4.xml><?xml version="1.0" encoding="utf-8"?>
+<p:sld xmlns:a="http://schemas.openxmlformats.org/drawingml/2006/main" xmlns:r="http://schemas.openxmlformats.org/officeDocument/2006/relationships" xmlns:p="http://schemas.openxmlformats.org/presentationml/2006/main">
+  <p:cSld>
+    <p:spTree>
+      <p:nvGrpSpPr>
+        <p:cNvPr id="1" name=""/>
+        <p:cNvGrpSpPr/>
+        <p:nvPr/>
+      </p:nvGrpSpPr>
+      <p:grpSpPr>
+        <a:xfrm>
+          <a:off x="0" y="0"/>
+          <a:ext cx="0" cy="0"/>
+          <a:chOff x="0" y="0"/>
+          <a:chExt cx="0" cy="0"/>
+        </a:xfrm>
+      </p:grpSpPr>
+      <p:sp>
+        <p:nvSpPr>
+          <p:cNvPr id="5" name="Заголовок 1"/>
+          <p:cNvSpPr>
+            <a:spLocks noGrp="1"/>
+          </p:cNvSpPr>
+          <p:nvPr>
+            <p:ph type="title"/>
+          </p:nvPr>
+        </p:nvSpPr>
+        <p:spPr/>
+        <p:txBody>
+          <a:bodyPr/>
+          <a:lstStyle/>
+          <a:p>
+            <a:r>
+              <a:rPr lang="en-US" dirty="0" smtClean="0"/>
+              <a:t>1. </a:t>
+            </a:r>
+            <a:r>
+              <a:rPr lang="ru-RU" dirty="0" smtClean="0"/>
+              <a:t>Сгенерировать карту</a:t>
+            </a:r>
+            <a:endParaRPr lang="ru-RU" dirty="0"/>
+          </a:p>
+        </p:txBody>
+      </p:sp>
+      <p:sp>
+        <p:nvSpPr>
+          <p:cNvPr id="4" name="Объект 3"/>
+          <p:cNvSpPr>
+            <a:spLocks noGrp="1"/>
+          </p:cNvSpPr>
+          <p:nvPr>
+            <p:ph idx="1"/>
+          </p:nvPr>
+        </p:nvSpPr>
+        <p:spPr/>
+        <p:txBody>
+          <a:bodyPr>
+            <a:noAutofit/>
+          </a:bodyPr>
+          <a:lstStyle/>
+          <a:p>
+            <a:pPr marL="0" indent="0">
+              <a:lnSpc>
+                <a:spcPct val="70000"/>
+              </a:lnSpc>
+              <a:buNone/>
+            </a:pPr>
+            <a:r>
+              <a:rPr lang="en-US" sz="2000" dirty="0">
+                <a:solidFill>
+                  <a:srgbClr val="0000FF"/>
+                </a:solidFill>
+                <a:highlight>
+                  <a:srgbClr val="FFFFFF"/>
+                </a:highlight>
+                <a:latin typeface="Consolas" panose="020B0609020204030204" pitchFamily="49" charset="0"/>
+              </a:rPr>
+              <a:t>public</a:t>
+            </a:r>
+            <a:r>
+              <a:rPr lang="en-US" sz="2000" dirty="0">
+                <a:solidFill>
+                  <a:srgbClr val="000000"/>
+                </a:solidFill>
+                <a:highlight>
+                  <a:srgbClr val="FFFFFF"/>
+                </a:highlight>
+                <a:latin typeface="Consolas" panose="020B0609020204030204" pitchFamily="49" charset="0"/>
+              </a:rPr>
+              <a:t> </a:t>
+            </a:r>
+            <a:r>
+              <a:rPr lang="en-US" sz="2000" dirty="0">
+                <a:solidFill>
+                  <a:srgbClr val="0000FF"/>
+                </a:solidFill>
+                <a:highlight>
+                  <a:srgbClr val="FFFFFF"/>
+                </a:highlight>
+                <a:latin typeface="Consolas" panose="020B0609020204030204" pitchFamily="49" charset="0"/>
+              </a:rPr>
+              <a:t>class</a:t>
+            </a:r>
+            <a:r>
+              <a:rPr lang="en-US" sz="2000" dirty="0">
+                <a:solidFill>
+                  <a:srgbClr val="000000"/>
+                </a:solidFill>
+                <a:highlight>
+                  <a:srgbClr val="FFFFFF"/>
+                </a:highlight>
+                <a:latin typeface="Consolas" panose="020B0609020204030204" pitchFamily="49" charset="0"/>
+              </a:rPr>
+              <a:t> </a:t>
+            </a:r>
+            <a:r>
+              <a:rPr lang="en-US" sz="2000" dirty="0">
+                <a:solidFill>
+                  <a:srgbClr val="2B91AF"/>
+                </a:solidFill>
+                <a:highlight>
+                  <a:srgbClr val="FFFFFF"/>
+                </a:highlight>
+                <a:latin typeface="Consolas" panose="020B0609020204030204" pitchFamily="49" charset="0"/>
+              </a:rPr>
+              <a:t>Game</a:t>
+            </a:r>
+            <a:r>
+              <a:rPr lang="en-US" sz="2000" dirty="0">
+                <a:solidFill>
+                  <a:srgbClr val="000000"/>
+                </a:solidFill>
+                <a:highlight>
+                  <a:srgbClr val="FFFFFF"/>
+                </a:highlight>
+                <a:latin typeface="Consolas" panose="020B0609020204030204" pitchFamily="49" charset="0"/>
+              </a:rPr>
+              <a:t> </a:t>
+            </a:r>
+            <a:r>
+              <a:rPr lang="ru-RU" sz="2000" dirty="0" smtClean="0">
+                <a:solidFill>
+                  <a:srgbClr val="000000"/>
+                </a:solidFill>
+                <a:highlight>
+                  <a:srgbClr val="FFFFFF"/>
+                </a:highlight>
+                <a:latin typeface="Consolas" panose="020B0609020204030204" pitchFamily="49" charset="0"/>
+              </a:rPr>
+              <a:t>{</a:t>
+            </a:r>
+            <a:endParaRPr lang="ru-RU" sz="2000" dirty="0">
+              <a:solidFill>
+                <a:srgbClr val="000000"/>
+              </a:solidFill>
+              <a:highlight>
+                <a:srgbClr val="FFFFFF"/>
+              </a:highlight>
+              <a:latin typeface="Consolas" panose="020B0609020204030204" pitchFamily="49" charset="0"/>
+            </a:endParaRPr>
+          </a:p>
+          <a:p>
+            <a:pPr marL="0" indent="0">
+              <a:lnSpc>
+                <a:spcPct val="70000"/>
+              </a:lnSpc>
+              <a:buNone/>
+            </a:pPr>
+            <a:r>
+              <a:rPr lang="en-US" sz="2000" dirty="0">
+                <a:solidFill>
+                  <a:srgbClr val="000000"/>
+                </a:solidFill>
+                <a:highlight>
+                  <a:srgbClr val="FFFFFF"/>
+                </a:highlight>
+                <a:latin typeface="Consolas" panose="020B0609020204030204" pitchFamily="49" charset="0"/>
+              </a:rPr>
+              <a:t>    </a:t>
+            </a:r>
+            <a:r>
+              <a:rPr lang="en-US" sz="2000" dirty="0">
+                <a:solidFill>
+                  <a:srgbClr val="0000FF"/>
+                </a:solidFill>
+                <a:highlight>
+                  <a:srgbClr val="FFFFFF"/>
+                </a:highlight>
+                <a:latin typeface="Consolas" panose="020B0609020204030204" pitchFamily="49" charset="0"/>
+              </a:rPr>
+              <a:t>private</a:t>
+            </a:r>
+            <a:r>
+              <a:rPr lang="en-US" sz="2000" dirty="0">
+                <a:solidFill>
+                  <a:srgbClr val="000000"/>
+                </a:solidFill>
+                <a:highlight>
+                  <a:srgbClr val="FFFFFF"/>
+                </a:highlight>
+                <a:latin typeface="Consolas" panose="020B0609020204030204" pitchFamily="49" charset="0"/>
+              </a:rPr>
+              <a:t> </a:t>
+            </a:r>
+            <a:r>
+              <a:rPr lang="en-US" sz="2000" dirty="0" err="1">
+                <a:solidFill>
+                  <a:srgbClr val="0000FF"/>
+                </a:solidFill>
+                <a:highlight>
+                  <a:srgbClr val="FFFFFF"/>
+                </a:highlight>
+                <a:latin typeface="Consolas" panose="020B0609020204030204" pitchFamily="49" charset="0"/>
+              </a:rPr>
+              <a:t>readonly</a:t>
+            </a:r>
+            <a:r>
+              <a:rPr lang="en-US" sz="2000" dirty="0">
+                <a:solidFill>
+                  <a:srgbClr val="000000"/>
+                </a:solidFill>
+                <a:highlight>
+                  <a:srgbClr val="FFFFFF"/>
+                </a:highlight>
+                <a:latin typeface="Consolas" panose="020B0609020204030204" pitchFamily="49" charset="0"/>
+              </a:rPr>
+              <a:t> </a:t>
+            </a:r>
+            <a:r>
+              <a:rPr lang="en-US" sz="2000" dirty="0" err="1" smtClean="0">
+                <a:solidFill>
+                  <a:srgbClr val="2B91AF"/>
+                </a:solidFill>
+                <a:highlight>
+                  <a:srgbClr val="FFFFFF"/>
+                </a:highlight>
+                <a:latin typeface="Consolas" panose="020B0609020204030204" pitchFamily="49" charset="0"/>
+              </a:rPr>
+              <a:t>IMapProvider</a:t>
+            </a:r>
+            <a:r>
+              <a:rPr lang="en-US" sz="2000" dirty="0" smtClean="0">
+                <a:solidFill>
+                  <a:srgbClr val="000000"/>
+                </a:solidFill>
+                <a:highlight>
+                  <a:srgbClr val="FFFFFF"/>
+                </a:highlight>
+                <a:latin typeface="Consolas" panose="020B0609020204030204" pitchFamily="49" charset="0"/>
+              </a:rPr>
+              <a:t> </a:t>
+            </a:r>
+            <a:r>
+              <a:rPr lang="en-US" sz="2000" dirty="0" err="1" smtClean="0">
+                <a:solidFill>
+                  <a:srgbClr val="000000"/>
+                </a:solidFill>
+                <a:highlight>
+                  <a:srgbClr val="FFFFFF"/>
+                </a:highlight>
+                <a:latin typeface="Consolas" panose="020B0609020204030204" pitchFamily="49" charset="0"/>
+              </a:rPr>
+              <a:t>mapProvider</a:t>
+            </a:r>
+            <a:r>
+              <a:rPr lang="en-US" sz="2000" dirty="0" smtClean="0">
+                <a:solidFill>
+                  <a:srgbClr val="000000"/>
+                </a:solidFill>
+                <a:highlight>
+                  <a:srgbClr val="FFFFFF"/>
+                </a:highlight>
+                <a:latin typeface="Consolas" panose="020B0609020204030204" pitchFamily="49" charset="0"/>
+              </a:rPr>
+              <a:t>;</a:t>
+            </a:r>
+            <a:endParaRPr lang="en-US" sz="2000" dirty="0">
+              <a:solidFill>
+                <a:srgbClr val="000000"/>
+              </a:solidFill>
+              <a:highlight>
+                <a:srgbClr val="FFFFFF"/>
+              </a:highlight>
+              <a:latin typeface="Consolas" panose="020B0609020204030204" pitchFamily="49" charset="0"/>
+            </a:endParaRPr>
+          </a:p>
+          <a:p>
+            <a:pPr marL="0" indent="0">
+              <a:lnSpc>
+                <a:spcPct val="70000"/>
+              </a:lnSpc>
+              <a:buNone/>
+            </a:pPr>
+            <a:endParaRPr lang="ru-RU" sz="2000" dirty="0">
+              <a:solidFill>
+                <a:srgbClr val="000000"/>
+              </a:solidFill>
+              <a:highlight>
+                <a:srgbClr val="FFFFFF"/>
+              </a:highlight>
+              <a:latin typeface="Consolas" panose="020B0609020204030204" pitchFamily="49" charset="0"/>
+            </a:endParaRPr>
+          </a:p>
+          <a:p>
+            <a:pPr marL="0" indent="0">
+              <a:lnSpc>
+                <a:spcPct val="70000"/>
+              </a:lnSpc>
+              <a:buNone/>
+            </a:pPr>
+            <a:r>
+              <a:rPr lang="en-US" sz="2000" dirty="0">
+                <a:solidFill>
+                  <a:srgbClr val="000000"/>
+                </a:solidFill>
+                <a:highlight>
+                  <a:srgbClr val="FFFFFF"/>
+                </a:highlight>
+                <a:latin typeface="Consolas" panose="020B0609020204030204" pitchFamily="49" charset="0"/>
+              </a:rPr>
+              <a:t>    </a:t>
+            </a:r>
+            <a:r>
+              <a:rPr lang="en-US" sz="2000" dirty="0">
+                <a:solidFill>
+                  <a:srgbClr val="0000FF"/>
+                </a:solidFill>
+                <a:highlight>
+                  <a:srgbClr val="FFFFFF"/>
+                </a:highlight>
+                <a:latin typeface="Consolas" panose="020B0609020204030204" pitchFamily="49" charset="0"/>
+              </a:rPr>
+              <a:t>public</a:t>
+            </a:r>
+            <a:r>
+              <a:rPr lang="en-US" sz="2000" dirty="0">
+                <a:solidFill>
+                  <a:srgbClr val="000000"/>
+                </a:solidFill>
+                <a:highlight>
+                  <a:srgbClr val="FFFFFF"/>
+                </a:highlight>
+                <a:latin typeface="Consolas" panose="020B0609020204030204" pitchFamily="49" charset="0"/>
+              </a:rPr>
+              <a:t> </a:t>
+            </a:r>
+            <a:r>
+              <a:rPr lang="en-US" sz="2000" dirty="0" smtClean="0">
+                <a:solidFill>
+                  <a:srgbClr val="000000"/>
+                </a:solidFill>
+                <a:highlight>
+                  <a:srgbClr val="FFFFFF"/>
+                </a:highlight>
+                <a:latin typeface="Consolas" panose="020B0609020204030204" pitchFamily="49" charset="0"/>
+              </a:rPr>
+              <a:t>Game(</a:t>
+            </a:r>
+            <a:r>
+              <a:rPr lang="en-US" sz="2000" dirty="0" err="1" smtClean="0">
+                <a:solidFill>
+                  <a:srgbClr val="2B91AF"/>
+                </a:solidFill>
+                <a:highlight>
+                  <a:srgbClr val="FFFFFF"/>
+                </a:highlight>
+                <a:latin typeface="Consolas" panose="020B0609020204030204" pitchFamily="49" charset="0"/>
+              </a:rPr>
+              <a:t>IMapProvider</a:t>
+            </a:r>
+            <a:r>
+              <a:rPr lang="en-US" sz="2000" dirty="0" smtClean="0">
+                <a:solidFill>
+                  <a:srgbClr val="000000"/>
+                </a:solidFill>
+                <a:highlight>
+                  <a:srgbClr val="FFFFFF"/>
+                </a:highlight>
+                <a:latin typeface="Consolas" panose="020B0609020204030204" pitchFamily="49" charset="0"/>
+              </a:rPr>
+              <a:t> </a:t>
+            </a:r>
+            <a:r>
+              <a:rPr lang="en-US" sz="2000" dirty="0" err="1" smtClean="0">
+                <a:solidFill>
+                  <a:srgbClr val="000000"/>
+                </a:solidFill>
+                <a:highlight>
+                  <a:srgbClr val="FFFFFF"/>
+                </a:highlight>
+                <a:latin typeface="Consolas" panose="020B0609020204030204" pitchFamily="49" charset="0"/>
+              </a:rPr>
+              <a:t>mapProvider</a:t>
+            </a:r>
+            <a:r>
+              <a:rPr lang="en-US" sz="2000" dirty="0" smtClean="0">
+                <a:solidFill>
+                  <a:srgbClr val="000000"/>
+                </a:solidFill>
+                <a:highlight>
+                  <a:srgbClr val="FFFFFF"/>
+                </a:highlight>
+                <a:latin typeface="Consolas" panose="020B0609020204030204" pitchFamily="49" charset="0"/>
+              </a:rPr>
+              <a:t>) </a:t>
+            </a:r>
+            <a:r>
+              <a:rPr lang="ru-RU" sz="2000" dirty="0" smtClean="0">
+                <a:solidFill>
+                  <a:srgbClr val="000000"/>
+                </a:solidFill>
+                <a:highlight>
+                  <a:srgbClr val="FFFFFF"/>
+                </a:highlight>
+                <a:latin typeface="Consolas" panose="020B0609020204030204" pitchFamily="49" charset="0"/>
+              </a:rPr>
+              <a:t>{</a:t>
+            </a:r>
+            <a:endParaRPr lang="ru-RU" sz="2000" dirty="0">
+              <a:solidFill>
+                <a:srgbClr val="000000"/>
+              </a:solidFill>
+              <a:highlight>
+                <a:srgbClr val="FFFFFF"/>
+              </a:highlight>
+              <a:latin typeface="Consolas" panose="020B0609020204030204" pitchFamily="49" charset="0"/>
+            </a:endParaRPr>
+          </a:p>
+          <a:p>
+            <a:pPr marL="0" indent="0">
+              <a:lnSpc>
+                <a:spcPct val="70000"/>
+              </a:lnSpc>
+              <a:buNone/>
+            </a:pPr>
+            <a:r>
+              <a:rPr lang="en-US" sz="2000" dirty="0">
+                <a:solidFill>
+                  <a:srgbClr val="000000"/>
+                </a:solidFill>
+                <a:highlight>
+                  <a:srgbClr val="FFFFFF"/>
+                </a:highlight>
+                <a:latin typeface="Consolas" panose="020B0609020204030204" pitchFamily="49" charset="0"/>
+              </a:rPr>
+              <a:t>        </a:t>
+            </a:r>
+            <a:r>
+              <a:rPr lang="en-US" sz="2000" dirty="0" err="1" smtClean="0">
+                <a:solidFill>
+                  <a:srgbClr val="0000FF"/>
+                </a:solidFill>
+                <a:highlight>
+                  <a:srgbClr val="FFFFFF"/>
+                </a:highlight>
+                <a:latin typeface="Consolas" panose="020B0609020204030204" pitchFamily="49" charset="0"/>
+              </a:rPr>
+              <a:t>this</a:t>
+            </a:r>
+            <a:r>
+              <a:rPr lang="en-US" sz="2000" dirty="0" err="1" smtClean="0">
+                <a:solidFill>
+                  <a:srgbClr val="000000"/>
+                </a:solidFill>
+                <a:highlight>
+                  <a:srgbClr val="FFFFFF"/>
+                </a:highlight>
+                <a:latin typeface="Consolas" panose="020B0609020204030204" pitchFamily="49" charset="0"/>
+              </a:rPr>
+              <a:t>.map</a:t>
+            </a:r>
+            <a:r>
+              <a:rPr lang="en-US" sz="2000" dirty="0" err="1">
+                <a:solidFill>
+                  <a:srgbClr val="000000"/>
+                </a:solidFill>
+                <a:highlight>
+                  <a:srgbClr val="FFFFFF"/>
+                </a:highlight>
+                <a:latin typeface="Consolas" panose="020B0609020204030204" pitchFamily="49" charset="0"/>
+              </a:rPr>
+              <a:t>Provider</a:t>
+            </a:r>
+            <a:r>
+              <a:rPr lang="en-US" sz="2000" dirty="0" smtClean="0">
+                <a:solidFill>
+                  <a:srgbClr val="000000"/>
+                </a:solidFill>
+                <a:highlight>
+                  <a:srgbClr val="FFFFFF"/>
+                </a:highlight>
+                <a:latin typeface="Consolas" panose="020B0609020204030204" pitchFamily="49" charset="0"/>
+              </a:rPr>
+              <a:t> </a:t>
+            </a:r>
+            <a:r>
+              <a:rPr lang="en-US" sz="2000" dirty="0">
+                <a:solidFill>
+                  <a:srgbClr val="000000"/>
+                </a:solidFill>
+                <a:highlight>
+                  <a:srgbClr val="FFFFFF"/>
+                </a:highlight>
+                <a:latin typeface="Consolas" panose="020B0609020204030204" pitchFamily="49" charset="0"/>
+              </a:rPr>
+              <a:t>= </a:t>
+            </a:r>
+            <a:r>
+              <a:rPr lang="en-US" sz="2000" dirty="0" err="1" smtClean="0">
+                <a:solidFill>
+                  <a:srgbClr val="000000"/>
+                </a:solidFill>
+                <a:highlight>
+                  <a:srgbClr val="FFFFFF"/>
+                </a:highlight>
+                <a:latin typeface="Consolas" panose="020B0609020204030204" pitchFamily="49" charset="0"/>
+              </a:rPr>
+              <a:t>map</a:t>
+            </a:r>
+            <a:r>
+              <a:rPr lang="en-US" sz="2000" dirty="0" err="1">
+                <a:solidFill>
+                  <a:srgbClr val="000000"/>
+                </a:solidFill>
+                <a:highlight>
+                  <a:srgbClr val="FFFFFF"/>
+                </a:highlight>
+                <a:latin typeface="Consolas" panose="020B0609020204030204" pitchFamily="49" charset="0"/>
+              </a:rPr>
+              <a:t>Provider</a:t>
+            </a:r>
+            <a:r>
+              <a:rPr lang="en-US" sz="2000" dirty="0" smtClean="0">
+                <a:solidFill>
+                  <a:srgbClr val="000000"/>
+                </a:solidFill>
+                <a:highlight>
+                  <a:srgbClr val="FFFFFF"/>
+                </a:highlight>
+                <a:latin typeface="Consolas" panose="020B0609020204030204" pitchFamily="49" charset="0"/>
+              </a:rPr>
+              <a:t>;</a:t>
+            </a:r>
+            <a:endParaRPr lang="en-US" sz="2000" dirty="0">
+              <a:solidFill>
+                <a:srgbClr val="000000"/>
+              </a:solidFill>
+              <a:highlight>
+                <a:srgbClr val="FFFFFF"/>
+              </a:highlight>
+              <a:latin typeface="Consolas" panose="020B0609020204030204" pitchFamily="49" charset="0"/>
+            </a:endParaRPr>
+          </a:p>
+          <a:p>
+            <a:pPr marL="0" indent="0">
+              <a:lnSpc>
+                <a:spcPct val="70000"/>
+              </a:lnSpc>
+              <a:buNone/>
+            </a:pPr>
+            <a:r>
+              <a:rPr lang="en-US" sz="2000" dirty="0" smtClean="0">
+                <a:solidFill>
+                  <a:srgbClr val="000000"/>
+                </a:solidFill>
+                <a:highlight>
+                  <a:srgbClr val="FFFFFF"/>
+                </a:highlight>
+                <a:latin typeface="Consolas" panose="020B0609020204030204" pitchFamily="49" charset="0"/>
+              </a:rPr>
+              <a:t>    </a:t>
+            </a:r>
+            <a:r>
+              <a:rPr lang="ru-RU" sz="2000" dirty="0" smtClean="0">
+                <a:solidFill>
+                  <a:srgbClr val="000000"/>
+                </a:solidFill>
+                <a:highlight>
+                  <a:srgbClr val="FFFFFF"/>
+                </a:highlight>
+                <a:latin typeface="Consolas" panose="020B0609020204030204" pitchFamily="49" charset="0"/>
+              </a:rPr>
+              <a:t>}</a:t>
+            </a:r>
+            <a:endParaRPr lang="ru-RU" sz="2000" dirty="0">
+              <a:solidFill>
+                <a:srgbClr val="000000"/>
+              </a:solidFill>
+              <a:highlight>
+                <a:srgbClr val="FFFFFF"/>
+              </a:highlight>
+              <a:latin typeface="Consolas" panose="020B0609020204030204" pitchFamily="49" charset="0"/>
+            </a:endParaRPr>
+          </a:p>
+          <a:p>
+            <a:pPr marL="0" indent="0">
+              <a:lnSpc>
+                <a:spcPct val="70000"/>
+              </a:lnSpc>
+              <a:buNone/>
+            </a:pPr>
+            <a:r>
+              <a:rPr lang="ru-RU" sz="2000" dirty="0" smtClean="0">
+                <a:solidFill>
+                  <a:srgbClr val="000000"/>
+                </a:solidFill>
+                <a:highlight>
+                  <a:srgbClr val="FFFFFF"/>
+                </a:highlight>
+                <a:latin typeface="Consolas" panose="020B0609020204030204" pitchFamily="49" charset="0"/>
+              </a:rPr>
+              <a:t>}</a:t>
+            </a:r>
+            <a:endParaRPr lang="ru-RU" sz="2000" dirty="0"/>
+          </a:p>
+        </p:txBody>
+      </p:sp>
+    </p:spTree>
+    <p:extLst>
+      <p:ext uri="{BB962C8B-B14F-4D97-AF65-F5344CB8AC3E}">
+        <p14:creationId xmlns:p14="http://schemas.microsoft.com/office/powerpoint/2010/main" val="2474282276"/>
+      </p:ext>
+    </p:extLst>
+  </p:cSld>
+  <p:clrMapOvr>
+    <a:masterClrMapping/>
+  </p:clrMapOvr>
+  <p:timing>
+    <p:tnLst>
+      <p:par>
+        <p:cTn id="1" dur="indefinite" restart="never" nodeType="tmRoot"/>
+      </p:par>
+    </p:tnLst>
+  </p:timing>
+</p:sld>
+</file>
+
+<file path=ppt/slides/slide40.xml><?xml version="1.0" encoding="utf-8"?>
 <p:sld xmlns:a="http://schemas.openxmlformats.org/drawingml/2006/main" xmlns:r="http://schemas.openxmlformats.org/officeDocument/2006/relationships" xmlns:p="http://schemas.openxmlformats.org/presentationml/2006/main">
   <p:cSld>
     <p:spTree>
@@ -24530,7 +24256,7 @@
 </p:sld>
 </file>
 
-<file path=ppt/slides/slide42.xml><?xml version="1.0" encoding="utf-8"?>
+<file path=ppt/slides/slide41.xml><?xml version="1.0" encoding="utf-8"?>
 <p:sld xmlns:a="http://schemas.openxmlformats.org/drawingml/2006/main" xmlns:r="http://schemas.openxmlformats.org/officeDocument/2006/relationships" xmlns:p="http://schemas.openxmlformats.org/presentationml/2006/main">
   <p:cSld>
     <p:spTree>
@@ -24709,6 +24435,126 @@
 </p:sld>
 </file>
 
+<file path=ppt/slides/slide42.xml><?xml version="1.0" encoding="utf-8"?>
+<p:sld xmlns:a="http://schemas.openxmlformats.org/drawingml/2006/main" xmlns:r="http://schemas.openxmlformats.org/officeDocument/2006/relationships" xmlns:p="http://schemas.openxmlformats.org/presentationml/2006/main">
+  <p:cSld>
+    <p:spTree>
+      <p:nvGrpSpPr>
+        <p:cNvPr id="1" name=""/>
+        <p:cNvGrpSpPr/>
+        <p:nvPr/>
+      </p:nvGrpSpPr>
+      <p:grpSpPr>
+        <a:xfrm>
+          <a:off x="0" y="0"/>
+          <a:ext cx="0" cy="0"/>
+          <a:chOff x="0" y="0"/>
+          <a:chExt cx="0" cy="0"/>
+        </a:xfrm>
+      </p:grpSpPr>
+      <p:sp>
+        <p:nvSpPr>
+          <p:cNvPr id="2" name="Заголовок 1"/>
+          <p:cNvSpPr>
+            <a:spLocks noGrp="1"/>
+          </p:cNvSpPr>
+          <p:nvPr>
+            <p:ph type="title"/>
+          </p:nvPr>
+        </p:nvSpPr>
+        <p:spPr/>
+        <p:txBody>
+          <a:bodyPr/>
+          <a:lstStyle/>
+          <a:p>
+            <a:r>
+              <a:rPr lang="en-US" dirty="0" smtClean="0"/>
+              <a:t>DI Container </a:t>
+            </a:r>
+            <a:r>
+              <a:rPr lang="ru-RU" dirty="0" smtClean="0"/>
+              <a:t>и </a:t>
+            </a:r>
+            <a:r>
+              <a:rPr lang="en-US" dirty="0" smtClean="0"/>
+              <a:t>FP</a:t>
+            </a:r>
+            <a:r>
+              <a:rPr lang="ru-RU" dirty="0" smtClean="0"/>
+              <a:t>?</a:t>
+            </a:r>
+            <a:endParaRPr lang="ru-RU" dirty="0"/>
+          </a:p>
+        </p:txBody>
+      </p:sp>
+      <p:sp>
+        <p:nvSpPr>
+          <p:cNvPr id="3" name="Объект 2"/>
+          <p:cNvSpPr>
+            <a:spLocks noGrp="1"/>
+          </p:cNvSpPr>
+          <p:nvPr>
+            <p:ph idx="1"/>
+          </p:nvPr>
+        </p:nvSpPr>
+        <p:spPr/>
+        <p:txBody>
+          <a:bodyPr/>
+          <a:lstStyle/>
+          <a:p>
+            <a:pPr marL="0" indent="0">
+              <a:buNone/>
+            </a:pPr>
+            <a:r>
+              <a:rPr lang="ru-RU" dirty="0" smtClean="0"/>
+              <a:t>Жесткость, которую создают интерфейсы помогает контейнеру собрать зависимости.</a:t>
+            </a:r>
+          </a:p>
+          <a:p>
+            <a:pPr marL="0" indent="0">
+              <a:buNone/>
+            </a:pPr>
+            <a:endParaRPr lang="ru-RU" dirty="0"/>
+          </a:p>
+          <a:p>
+            <a:pPr marL="0" indent="0">
+              <a:buNone/>
+            </a:pPr>
+            <a:r>
+              <a:rPr lang="ru-RU" dirty="0" smtClean="0"/>
+              <a:t>Гибкость </a:t>
+            </a:r>
+            <a:r>
+              <a:rPr lang="en-US" dirty="0" smtClean="0"/>
+              <a:t>FP</a:t>
+            </a:r>
+            <a:r>
+              <a:rPr lang="ru-RU" dirty="0" smtClean="0"/>
+              <a:t> лишает контейнер почвы под ногами</a:t>
+            </a:r>
+          </a:p>
+        </p:txBody>
+      </p:sp>
+    </p:spTree>
+    <p:extLst>
+      <p:ext uri="{BB962C8B-B14F-4D97-AF65-F5344CB8AC3E}">
+        <p14:creationId xmlns:p14="http://schemas.microsoft.com/office/powerpoint/2010/main" val="2612602943"/>
+      </p:ext>
+    </p:extLst>
+  </p:cSld>
+  <p:clrMapOvr>
+    <a:masterClrMapping/>
+  </p:clrMapOvr>
+  <p:timing>
+    <p:tnLst>
+      <p:par>
+        <p:cTn id="1" dur="indefinite" restart="never" nodeType="tmRoot"/>
+      </p:par>
+    </p:tnLst>
+  </p:timing>
+</p:sld>
+</file>
+
 <file path=ppt/slides/slide43.xml><?xml version="1.0" encoding="utf-8"?>
 <p:sld xmlns:a="http://schemas.openxmlformats.org/drawingml/2006/main" xmlns:r="http://schemas.openxmlformats.org/officeDocument/2006/relationships" xmlns:p="http://schemas.openxmlformats.org/presentationml/2006/main">
   <p:cSld>
@@ -24743,19 +24589,7 @@
           <a:p>
             <a:r>
               <a:rPr lang="en-US" dirty="0" smtClean="0"/>
-              <a:t>DI Container </a:t>
-            </a:r>
-            <a:r>
-              <a:rPr lang="ru-RU" dirty="0" smtClean="0"/>
-              <a:t>и </a:t>
-            </a:r>
-            <a:r>
-              <a:rPr lang="en-US" dirty="0" smtClean="0"/>
-              <a:t>FP</a:t>
-            </a:r>
-            <a:r>
-              <a:rPr lang="ru-RU" dirty="0" smtClean="0"/>
-              <a:t>?</a:t>
+              <a:t>FP Style</a:t>
             </a:r>
             <a:endParaRPr lang="ru-RU" dirty="0"/>
           </a:p>
@@ -24776,114 +24610,10 @@
           <a:bodyPr/>
           <a:lstStyle/>
           <a:p>
-            <a:pPr marL="0" indent="0">
-              <a:buNone/>
+            <a:pPr marL="514350" indent="-514350">
+              <a:buFont typeface="+mj-lt"/>
+              <a:buAutoNum type="arabicPeriod"/>
             </a:pPr>
-            <a:r>
-              <a:rPr lang="ru-RU" dirty="0" smtClean="0"/>
-              <a:t>Жесткость, которую создают интерфейсы помогает контейнеру собрать зависимости.</a:t>
-            </a:r>
-          </a:p>
-          <a:p>
-            <a:pPr marL="0" indent="0">
-              <a:buNone/>
-            </a:pPr>
-            <a:endParaRPr lang="ru-RU" dirty="0"/>
-          </a:p>
-          <a:p>
-            <a:pPr marL="0" indent="0">
-              <a:buNone/>
-            </a:pPr>
-            <a:r>
-              <a:rPr lang="ru-RU" dirty="0" smtClean="0"/>
-              <a:t>Гибкость </a:t>
-            </a:r>
-            <a:r>
-              <a:rPr lang="en-US" dirty="0" smtClean="0"/>
-              <a:t>FP</a:t>
-            </a:r>
-            <a:r>
-              <a:rPr lang="ru-RU" dirty="0" smtClean="0"/>
-              <a:t> лишает контейнер почвы под ногами</a:t>
-            </a:r>
-          </a:p>
-        </p:txBody>
-      </p:sp>
-    </p:spTree>
-    <p:extLst>
-      <p:ext uri="{BB962C8B-B14F-4D97-AF65-F5344CB8AC3E}">
-        <p14:creationId xmlns:p14="http://schemas.microsoft.com/office/powerpoint/2010/main" val="2612602943"/>
-      </p:ext>
-    </p:extLst>
-  </p:cSld>
-  <p:clrMapOvr>
-    <a:masterClrMapping/>
-  </p:clrMapOvr>
-  <p:timing>
-    <p:tnLst>
-      <p:par>
-        <p:cTn id="1" dur="indefinite" restart="never" nodeType="tmRoot"/>
-      </p:par>
-    </p:tnLst>
-  </p:timing>
-</p:sld>
-</file>
-
-<file path=ppt/slides/slide44.xml><?xml version="1.0" encoding="utf-8"?>
-<p:sld xmlns:a="http://schemas.openxmlformats.org/drawingml/2006/main" xmlns:r="http://schemas.openxmlformats.org/officeDocument/2006/relationships" xmlns:p="http://schemas.openxmlformats.org/presentationml/2006/main">
-  <p:cSld>
-    <p:spTree>
-      <p:nvGrpSpPr>
-        <p:cNvPr id="1" name=""/>
-        <p:cNvGrpSpPr/>
-        <p:nvPr/>
-      </p:nvGrpSpPr>
-      <p:grpSpPr>
-        <a:xfrm>
-          <a:off x="0" y="0"/>
-          <a:ext cx="0" cy="0"/>
-          <a:chOff x="0" y="0"/>
-          <a:chExt cx="0" cy="0"/>
-        </a:xfrm>
-      </p:grpSpPr>
-      <p:sp>
-        <p:nvSpPr>
-          <p:cNvPr id="2" name="Заголовок 1"/>
-          <p:cNvSpPr>
-            <a:spLocks noGrp="1"/>
-          </p:cNvSpPr>
-          <p:nvPr>
-            <p:ph type="title"/>
-          </p:nvPr>
-        </p:nvSpPr>
-        <p:spPr/>
-        <p:txBody>
-          <a:bodyPr/>
-          <a:lstStyle/>
-          <a:p>
-            <a:r>
-              <a:rPr lang="en-US" dirty="0" smtClean="0"/>
-              <a:t>FP Style</a:t>
-            </a:r>
-            <a:endParaRPr lang="ru-RU" dirty="0"/>
-          </a:p>
-        </p:txBody>
-      </p:sp>
-      <p:sp>
-        <p:nvSpPr>
-          <p:cNvPr id="3" name="Объект 2"/>
-          <p:cNvSpPr>
-            <a:spLocks noGrp="1"/>
-          </p:cNvSpPr>
-          <p:nvPr>
-            <p:ph idx="1"/>
-          </p:nvPr>
-        </p:nvSpPr>
-        <p:spPr/>
-        <p:txBody>
-          <a:bodyPr/>
-          <a:lstStyle/>
-          <a:p>
             <a:r>
               <a:rPr lang="en-US" dirty="0" smtClean="0"/>
               <a:t>Value-</a:t>
@@ -24909,6 +24639,10 @@
             <a:endParaRPr lang="ru-RU" dirty="0" smtClean="0"/>
           </a:p>
           <a:p>
+            <a:pPr marL="514350" indent="-514350">
+              <a:buFont typeface="+mj-lt"/>
+              <a:buAutoNum type="arabicPeriod"/>
+            </a:pPr>
             <a:r>
               <a:rPr lang="ru-RU" dirty="0" smtClean="0"/>
               <a:t>Чистые функции, принимающие и возвращающие </a:t>
@@ -24924,6 +24658,10 @@
             <a:endParaRPr lang="ru-RU" dirty="0"/>
           </a:p>
           <a:p>
+            <a:pPr marL="514350" indent="-514350">
+              <a:buFont typeface="+mj-lt"/>
+              <a:buAutoNum type="arabicPeriod"/>
+            </a:pPr>
             <a:r>
               <a:rPr lang="en-US" dirty="0" smtClean="0"/>
               <a:t>Dependency Injection via </a:t>
@@ -24934,6 +24672,10 @@
             </a:r>
           </a:p>
           <a:p>
+            <a:pPr marL="514350" indent="-514350">
+              <a:buFont typeface="+mj-lt"/>
+              <a:buAutoNum type="arabicPeriod"/>
+            </a:pPr>
             <a:r>
               <a:rPr lang="ru-RU" dirty="0" smtClean="0"/>
               <a:t>Побочные эффекты примешиваются </a:t>
@@ -24969,7 +24711,7 @@
 </p:sld>
 </file>
 
-<file path=ppt/slides/slide45.xml><?xml version="1.0" encoding="utf-8"?>
+<file path=ppt/slides/slide44.xml><?xml version="1.0" encoding="utf-8"?>
 <p:sld xmlns:a="http://schemas.openxmlformats.org/drawingml/2006/main" xmlns:r="http://schemas.openxmlformats.org/officeDocument/2006/relationships" xmlns:p="http://schemas.openxmlformats.org/presentationml/2006/main">
   <p:cSld>
     <p:spTree>
@@ -27117,7 +26859,7 @@
 </p:sld>
 </file>
 
-<file path=ppt/slides/slide46.xml><?xml version="1.0" encoding="utf-8"?>
+<file path=ppt/slides/slide45.xml><?xml version="1.0" encoding="utf-8"?>
 <p:sld xmlns:a="http://schemas.openxmlformats.org/drawingml/2006/main" xmlns:r="http://schemas.openxmlformats.org/officeDocument/2006/relationships" xmlns:p="http://schemas.openxmlformats.org/presentationml/2006/main">
   <p:cSld>
     <p:spTree>
@@ -29210,7 +28952,7 @@
 </p:sld>
 </file>
 
-<file path=ppt/slides/slide47.xml><?xml version="1.0" encoding="utf-8"?>
+<file path=ppt/slides/slide46.xml><?xml version="1.0" encoding="utf-8"?>
 <p:sld xmlns:a="http://schemas.openxmlformats.org/drawingml/2006/main" xmlns:r="http://schemas.openxmlformats.org/officeDocument/2006/relationships" xmlns:p="http://schemas.openxmlformats.org/presentationml/2006/main">
   <p:cSld>
     <p:spTree>
@@ -29302,6 +29044,204 @@
     <p:tnLst>
       <p:par>
         <p:cTn id="1" dur="indefinite" restart="never" nodeType="tmRoot"/>
+      </p:par>
+    </p:tnLst>
+  </p:timing>
+</p:sld>
+</file>
+
+<file path=ppt/slides/slide47.xml><?xml version="1.0" encoding="utf-8"?>
+<p:sld xmlns:a="http://schemas.openxmlformats.org/drawingml/2006/main" xmlns:r="http://schemas.openxmlformats.org/officeDocument/2006/relationships" xmlns:p="http://schemas.openxmlformats.org/presentationml/2006/main">
+  <p:cSld>
+    <p:spTree>
+      <p:nvGrpSpPr>
+        <p:cNvPr id="1" name=""/>
+        <p:cNvGrpSpPr/>
+        <p:nvPr/>
+      </p:nvGrpSpPr>
+      <p:grpSpPr>
+        <a:xfrm>
+          <a:off x="0" y="0"/>
+          <a:ext cx="0" cy="0"/>
+          <a:chOff x="0" y="0"/>
+          <a:chExt cx="0" cy="0"/>
+        </a:xfrm>
+      </p:grpSpPr>
+      <p:sp>
+        <p:nvSpPr>
+          <p:cNvPr id="8" name="Объект 7"/>
+          <p:cNvSpPr>
+            <a:spLocks noGrp="1"/>
+          </p:cNvSpPr>
+          <p:nvPr>
+            <p:ph idx="1"/>
+          </p:nvPr>
+        </p:nvSpPr>
+        <p:spPr>
+          <a:xfrm>
+            <a:off x="347330" y="1853966"/>
+            <a:ext cx="8420986" cy="5004033"/>
+          </a:xfrm>
+        </p:spPr>
+        <p:txBody>
+          <a:bodyPr>
+            <a:normAutofit/>
+          </a:bodyPr>
+          <a:lstStyle/>
+          <a:p>
+            <a:pPr marL="0" indent="0">
+              <a:buNone/>
+            </a:pPr>
+            <a:r>
+              <a:rPr lang="en-US" dirty="0" smtClean="0"/>
+              <a:t>SOLID</a:t>
+            </a:r>
+            <a:r>
+              <a:rPr lang="ru-RU" dirty="0" smtClean="0"/>
+              <a:t> полезен</a:t>
+            </a:r>
+            <a:r>
+              <a:rPr lang="ru-RU" dirty="0"/>
+              <a:t>,</a:t>
+            </a:r>
+            <a:endParaRPr lang="ru-RU" dirty="0" smtClean="0"/>
+          </a:p>
+          <a:p>
+            <a:pPr marL="0" indent="0">
+              <a:buNone/>
+            </a:pPr>
+            <a:r>
+              <a:rPr lang="ru-RU" dirty="0" smtClean="0"/>
+              <a:t>	но </a:t>
+            </a:r>
+            <a:r>
+              <a:rPr lang="ru-RU" i="1" dirty="0" smtClean="0"/>
+              <a:t>чаще </a:t>
+            </a:r>
+            <a:r>
+              <a:rPr lang="en-US" dirty="0" smtClean="0"/>
+              <a:t>FP</a:t>
+            </a:r>
+            <a:r>
+              <a:rPr lang="ru-RU" dirty="0" smtClean="0"/>
+              <a:t> делает код чище!</a:t>
+            </a:r>
+          </a:p>
+        </p:txBody>
+      </p:sp>
+      <p:sp>
+        <p:nvSpPr>
+          <p:cNvPr id="11" name="Заголовок 6"/>
+          <p:cNvSpPr>
+            <a:spLocks noGrp="1"/>
+          </p:cNvSpPr>
+          <p:nvPr>
+            <p:ph type="title"/>
+          </p:nvPr>
+        </p:nvSpPr>
+        <p:spPr/>
+        <p:txBody>
+          <a:bodyPr/>
+          <a:lstStyle/>
+          <a:p>
+            <a:r>
+              <a:rPr lang="en-US" dirty="0"/>
+              <a:t>Functional </a:t>
+            </a:r>
+            <a:r>
+              <a:rPr lang="en-US" dirty="0" smtClean="0"/>
+              <a:t>vs SOLID</a:t>
+            </a:r>
+            <a:endParaRPr lang="ru-RU" dirty="0"/>
+          </a:p>
+        </p:txBody>
+      </p:sp>
+    </p:spTree>
+    <p:extLst>
+      <p:ext uri="{BB962C8B-B14F-4D97-AF65-F5344CB8AC3E}">
+        <p14:creationId xmlns:p14="http://schemas.microsoft.com/office/powerpoint/2010/main" val="691198416"/>
+      </p:ext>
+    </p:extLst>
+  </p:cSld>
+  <p:clrMapOvr>
+    <a:masterClrMapping/>
+  </p:clrMapOvr>
+  <p:timing>
+    <p:tnLst>
+      <p:par>
+        <p:cTn id="1" dur="indefinite" restart="never" nodeType="tmRoot">
+          <p:childTnLst>
+            <p:seq concurrent="1" nextAc="seek">
+              <p:cTn id="2" dur="indefinite" nodeType="mainSeq">
+                <p:childTnLst>
+                  <p:par>
+                    <p:cTn id="3" fill="hold">
+                      <p:stCondLst>
+                        <p:cond delay="indefinite"/>
+                      </p:stCondLst>
+                      <p:childTnLst>
+                        <p:par>
+                          <p:cTn id="4" fill="hold">
+                            <p:stCondLst>
+                              <p:cond delay="0"/>
+                            </p:stCondLst>
+                            <p:childTnLst>
+                              <p:par>
+                                <p:cTn id="5" presetID="1" presetClass="entr" presetSubtype="0" fill="hold" nodeType="clickEffect">
+                                  <p:stCondLst>
+                                    <p:cond delay="0"/>
+                                  </p:stCondLst>
+                                  <p:childTnLst>
+                                    <p:set>
+                                      <p:cBhvr>
+                                        <p:cTn id="6" dur="1" fill="hold">
+                                          <p:stCondLst>
+                                            <p:cond delay="0"/>
+                                          </p:stCondLst>
+                                        </p:cTn>
+                                        <p:tgtEl>
+                                          <p:spTgt spid="8">
+                                            <p:txEl>
+                                              <p:pRg st="1" end="1"/>
+                                            </p:txEl>
+                                          </p:spTgt>
+                                        </p:tgtEl>
+                                        <p:attrNameLst>
+                                          <p:attrName>style.visibility</p:attrName>
+                                        </p:attrNameLst>
+                                      </p:cBhvr>
+                                      <p:to>
+                                        <p:strVal val="visible"/>
+                                      </p:to>
+                                    </p:set>
+                                  </p:childTnLst>
+                                </p:cTn>
+                              </p:par>
+                            </p:childTnLst>
+                          </p:cTn>
+                        </p:par>
+                      </p:childTnLst>
+                    </p:cTn>
+                  </p:par>
+                </p:childTnLst>
+              </p:cTn>
+              <p:prevCondLst>
+                <p:cond evt="onPrev" delay="0">
+                  <p:tgtEl>
+                    <p:sldTgt/>
+                  </p:tgtEl>
+                </p:cond>
+              </p:prevCondLst>
+              <p:nextCondLst>
+                <p:cond evt="onNext" delay="0">
+                  <p:tgtEl>
+                    <p:sldTgt/>
+                  </p:tgtEl>
+                </p:cond>
+              </p:nextCondLst>
+            </p:seq>
+          </p:childTnLst>
+        </p:cTn>
       </p:par>
     </p:tnLst>
   </p:timing>

</xml_diff>